<commit_message>
removed reference to "predictive analytics"
we have not code using machine learning algorithms for predictive analytics
</commit_message>
<xml_diff>
--- a/Case_Study_4_Pitch_TODD.pptx
+++ b/Case_Study_4_Pitch_TODD.pptx
@@ -117,6 +117,10 @@
 </p:presentation>
 </file>
 
+<file path=ppt/revisionInfo.xml><?xml version="1.0" encoding="utf-8"?>
+<p1510:revInfo xmlns:a="http://schemas.openxmlformats.org/drawingml/2006/main" xmlns:r="http://schemas.openxmlformats.org/officeDocument/2006/relationships" xmlns:p1510="http://schemas.microsoft.com/office/powerpoint/2015/10/main"/>
+</file>
+
 <file path=ppt/diagrams/colors1.xml><?xml version="1.0" encoding="utf-8"?>
 <dgm:colorsDef xmlns:dgm="http://schemas.openxmlformats.org/drawingml/2006/diagram" xmlns:a="http://schemas.openxmlformats.org/drawingml/2006/main" uniqueId="urn:microsoft.com/office/officeart/2005/8/colors/accent1_2">
   <dgm:title val=""/>
@@ -1633,10 +1637,9 @@
         <a:lstStyle/>
         <a:p>
           <a:r>
-            <a:rPr lang="en-US" dirty="0" smtClean="0"/>
+            <a:rPr lang="en-US" dirty="0"/>
             <a:t>C-level Executives</a:t>
           </a:r>
-          <a:endParaRPr lang="en-US" dirty="0"/>
         </a:p>
       </dgm:t>
     </dgm:pt>
@@ -1670,10 +1673,9 @@
         <a:lstStyle/>
         <a:p>
           <a:r>
-            <a:rPr lang="en-US" dirty="0" smtClean="0"/>
+            <a:rPr lang="en-US" dirty="0"/>
             <a:t>Mid-level Managers</a:t>
           </a:r>
-          <a:endParaRPr lang="en-US" dirty="0"/>
         </a:p>
       </dgm:t>
     </dgm:pt>
@@ -1707,10 +1709,9 @@
         <a:lstStyle/>
         <a:p>
           <a:r>
-            <a:rPr lang="en-US" dirty="0" smtClean="0"/>
+            <a:rPr lang="en-US" dirty="0"/>
             <a:t>Low-level Managers</a:t>
           </a:r>
-          <a:endParaRPr lang="en-US" dirty="0"/>
         </a:p>
       </dgm:t>
     </dgm:pt>
@@ -1744,10 +1745,9 @@
         <a:lstStyle/>
         <a:p>
           <a:r>
-            <a:rPr lang="en-US" dirty="0" smtClean="0"/>
+            <a:rPr lang="en-US" dirty="0"/>
             <a:t>Customers</a:t>
           </a:r>
-          <a:endParaRPr lang="en-US" dirty="0"/>
         </a:p>
       </dgm:t>
     </dgm:pt>
@@ -1785,13 +1785,6 @@
         </dgm:presLayoutVars>
       </dgm:prSet>
       <dgm:spPr/>
-      <dgm:t>
-        <a:bodyPr/>
-        <a:lstStyle/>
-        <a:p>
-          <a:endParaRPr lang="en-US"/>
-        </a:p>
-      </dgm:t>
     </dgm:pt>
     <dgm:pt modelId="{9EE5B969-F25F-45BE-B520-7AD4BC6C515C}" type="pres">
       <dgm:prSet presAssocID="{19BC2258-1378-4783-92CF-43C08D842F16}" presName="hierRoot1" presStyleCnt="0">
@@ -1812,24 +1805,10 @@
         </dgm:presLayoutVars>
       </dgm:prSet>
       <dgm:spPr/>
-      <dgm:t>
-        <a:bodyPr/>
-        <a:lstStyle/>
-        <a:p>
-          <a:endParaRPr lang="en-US"/>
-        </a:p>
-      </dgm:t>
     </dgm:pt>
     <dgm:pt modelId="{4DAF996E-A868-442E-8162-F5C6317EA988}" type="pres">
       <dgm:prSet presAssocID="{19BC2258-1378-4783-92CF-43C08D842F16}" presName="rootConnector1" presStyleLbl="node1" presStyleIdx="0" presStyleCnt="0"/>
       <dgm:spPr/>
-      <dgm:t>
-        <a:bodyPr/>
-        <a:lstStyle/>
-        <a:p>
-          <a:endParaRPr lang="en-US"/>
-        </a:p>
-      </dgm:t>
     </dgm:pt>
     <dgm:pt modelId="{DBA14755-1466-4B62-B5FB-C6BA5704785A}" type="pres">
       <dgm:prSet presAssocID="{19BC2258-1378-4783-92CF-43C08D842F16}" presName="hierChild2" presStyleCnt="0"/>
@@ -1842,13 +1821,6 @@
     <dgm:pt modelId="{1E81F0C9-25DE-484E-BC23-804DCCDC7033}" type="pres">
       <dgm:prSet presAssocID="{C0D7C41E-7F8A-4C0F-A887-175F317E6C89}" presName="Name111" presStyleLbl="parChTrans1D2" presStyleIdx="0" presStyleCnt="1"/>
       <dgm:spPr/>
-      <dgm:t>
-        <a:bodyPr/>
-        <a:lstStyle/>
-        <a:p>
-          <a:endParaRPr lang="en-US"/>
-        </a:p>
-      </dgm:t>
     </dgm:pt>
     <dgm:pt modelId="{CA52EDD0-C08E-4E29-96A1-C7B6C4752BF0}" type="pres">
       <dgm:prSet presAssocID="{9372CC14-96CC-4066-8C00-295F16D627EC}" presName="hierRoot3" presStyleCnt="0">
@@ -1869,24 +1841,10 @@
         </dgm:presLayoutVars>
       </dgm:prSet>
       <dgm:spPr/>
-      <dgm:t>
-        <a:bodyPr/>
-        <a:lstStyle/>
-        <a:p>
-          <a:endParaRPr lang="en-US"/>
-        </a:p>
-      </dgm:t>
     </dgm:pt>
     <dgm:pt modelId="{6344572F-E519-4584-AE7E-38856334C02C}" type="pres">
       <dgm:prSet presAssocID="{9372CC14-96CC-4066-8C00-295F16D627EC}" presName="rootConnector3" presStyleLbl="asst1" presStyleIdx="0" presStyleCnt="3"/>
       <dgm:spPr/>
-      <dgm:t>
-        <a:bodyPr/>
-        <a:lstStyle/>
-        <a:p>
-          <a:endParaRPr lang="en-US"/>
-        </a:p>
-      </dgm:t>
     </dgm:pt>
     <dgm:pt modelId="{36F1CD3D-5F21-4F13-BEF8-5141B047FB67}" type="pres">
       <dgm:prSet presAssocID="{9372CC14-96CC-4066-8C00-295F16D627EC}" presName="hierChild6" presStyleCnt="0"/>
@@ -1899,13 +1857,6 @@
     <dgm:pt modelId="{39165F29-C233-4038-84F6-8E9E65F1C269}" type="pres">
       <dgm:prSet presAssocID="{6609A656-C1C6-4EF9-A01D-53AD9AC12958}" presName="Name111" presStyleLbl="parChTrans1D3" presStyleIdx="0" presStyleCnt="1"/>
       <dgm:spPr/>
-      <dgm:t>
-        <a:bodyPr/>
-        <a:lstStyle/>
-        <a:p>
-          <a:endParaRPr lang="en-US"/>
-        </a:p>
-      </dgm:t>
     </dgm:pt>
     <dgm:pt modelId="{3F7DAA5F-B10D-45FE-A39C-A53A95622F99}" type="pres">
       <dgm:prSet presAssocID="{502E8B4F-35A6-47D4-A4E4-F9EC393F64A2}" presName="hierRoot3" presStyleCnt="0">
@@ -1926,24 +1877,10 @@
         </dgm:presLayoutVars>
       </dgm:prSet>
       <dgm:spPr/>
-      <dgm:t>
-        <a:bodyPr/>
-        <a:lstStyle/>
-        <a:p>
-          <a:endParaRPr lang="en-US"/>
-        </a:p>
-      </dgm:t>
     </dgm:pt>
     <dgm:pt modelId="{457987E4-2239-4423-AB6B-04B1394DFE58}" type="pres">
       <dgm:prSet presAssocID="{502E8B4F-35A6-47D4-A4E4-F9EC393F64A2}" presName="rootConnector3" presStyleLbl="asst1" presStyleIdx="1" presStyleCnt="3"/>
       <dgm:spPr/>
-      <dgm:t>
-        <a:bodyPr/>
-        <a:lstStyle/>
-        <a:p>
-          <a:endParaRPr lang="en-US"/>
-        </a:p>
-      </dgm:t>
     </dgm:pt>
     <dgm:pt modelId="{60994875-6EFF-49C4-837A-3C75425978CF}" type="pres">
       <dgm:prSet presAssocID="{502E8B4F-35A6-47D4-A4E4-F9EC393F64A2}" presName="hierChild6" presStyleCnt="0"/>
@@ -1956,13 +1893,6 @@
     <dgm:pt modelId="{81887688-5C12-43E8-94CE-58B89BBFF3AF}" type="pres">
       <dgm:prSet presAssocID="{0D7A434D-CCED-4734-893A-23488F39B4DE}" presName="Name111" presStyleLbl="parChTrans1D4" presStyleIdx="0" presStyleCnt="1"/>
       <dgm:spPr/>
-      <dgm:t>
-        <a:bodyPr/>
-        <a:lstStyle/>
-        <a:p>
-          <a:endParaRPr lang="en-US"/>
-        </a:p>
-      </dgm:t>
     </dgm:pt>
     <dgm:pt modelId="{1E629F54-3DC7-4945-ACA7-75907A79FA15}" type="pres">
       <dgm:prSet presAssocID="{A7181CF2-5F4F-4A43-BEAE-2D21212C1B93}" presName="hierRoot3" presStyleCnt="0">
@@ -1983,24 +1913,10 @@
         </dgm:presLayoutVars>
       </dgm:prSet>
       <dgm:spPr/>
-      <dgm:t>
-        <a:bodyPr/>
-        <a:lstStyle/>
-        <a:p>
-          <a:endParaRPr lang="en-US"/>
-        </a:p>
-      </dgm:t>
     </dgm:pt>
     <dgm:pt modelId="{04E5964E-6F5F-40CE-A554-1013C0BB4C0E}" type="pres">
       <dgm:prSet presAssocID="{A7181CF2-5F4F-4A43-BEAE-2D21212C1B93}" presName="rootConnector3" presStyleLbl="asst1" presStyleIdx="2" presStyleCnt="3"/>
       <dgm:spPr/>
-      <dgm:t>
-        <a:bodyPr/>
-        <a:lstStyle/>
-        <a:p>
-          <a:endParaRPr lang="en-US"/>
-        </a:p>
-      </dgm:t>
     </dgm:pt>
     <dgm:pt modelId="{1411F933-38BB-4BA0-96A0-0D9A8CD3E8CE}" type="pres">
       <dgm:prSet presAssocID="{A7181CF2-5F4F-4A43-BEAE-2D21212C1B93}" presName="hierChild6" presStyleCnt="0"/>
@@ -2012,21 +1928,21 @@
     </dgm:pt>
   </dgm:ptLst>
   <dgm:cxnLst>
+    <dgm:cxn modelId="{3BA64F17-A8ED-4456-9EE4-6B353CE47834}" type="presOf" srcId="{502E8B4F-35A6-47D4-A4E4-F9EC393F64A2}" destId="{457987E4-2239-4423-AB6B-04B1394DFE58}" srcOrd="1" destOrd="0" presId="urn:microsoft.com/office/officeart/2005/8/layout/orgChart1"/>
+    <dgm:cxn modelId="{48796723-A78A-455C-943C-1354583F497F}" srcId="{502E8B4F-35A6-47D4-A4E4-F9EC393F64A2}" destId="{A7181CF2-5F4F-4A43-BEAE-2D21212C1B93}" srcOrd="0" destOrd="0" parTransId="{0D7A434D-CCED-4734-893A-23488F39B4DE}" sibTransId="{520544C9-4F1E-4AB2-96BE-BE9EB76543E7}"/>
+    <dgm:cxn modelId="{3D373C31-8FEC-4DD6-88DF-4F0B048FBFFC}" srcId="{19BC2258-1378-4783-92CF-43C08D842F16}" destId="{9372CC14-96CC-4066-8C00-295F16D627EC}" srcOrd="0" destOrd="0" parTransId="{C0D7C41E-7F8A-4C0F-A887-175F317E6C89}" sibTransId="{A9D3B2D7-2DEF-4E2E-9A6C-D748F0389C15}"/>
+    <dgm:cxn modelId="{A9A18A35-C084-4871-9D21-8D2738B9FC89}" type="presOf" srcId="{E66DF6A1-FDCB-4BB0-8D52-5EAE31044073}" destId="{0E0FBBFC-3721-4238-B19A-4906734F0ADA}" srcOrd="0" destOrd="0" presId="urn:microsoft.com/office/officeart/2005/8/layout/orgChart1"/>
+    <dgm:cxn modelId="{4C937965-C979-49F1-B5A0-692F9FEA9E60}" type="presOf" srcId="{9372CC14-96CC-4066-8C00-295F16D627EC}" destId="{6344572F-E519-4584-AE7E-38856334C02C}" srcOrd="1" destOrd="0" presId="urn:microsoft.com/office/officeart/2005/8/layout/orgChart1"/>
+    <dgm:cxn modelId="{995EC76A-184D-4941-AA1B-8C865B0BA753}" type="presOf" srcId="{0D7A434D-CCED-4734-893A-23488F39B4DE}" destId="{81887688-5C12-43E8-94CE-58B89BBFF3AF}" srcOrd="0" destOrd="0" presId="urn:microsoft.com/office/officeart/2005/8/layout/orgChart1"/>
+    <dgm:cxn modelId="{82A0196D-1A8D-4BFF-BD1D-8425BE4F2C5E}" type="presOf" srcId="{19BC2258-1378-4783-92CF-43C08D842F16}" destId="{4DAF996E-A868-442E-8162-F5C6317EA988}" srcOrd="1" destOrd="0" presId="urn:microsoft.com/office/officeart/2005/8/layout/orgChart1"/>
     <dgm:cxn modelId="{899AB474-B25B-43D0-98DE-795AA934B516}" type="presOf" srcId="{C0D7C41E-7F8A-4C0F-A887-175F317E6C89}" destId="{1E81F0C9-25DE-484E-BC23-804DCCDC7033}" srcOrd="0" destOrd="0" presId="urn:microsoft.com/office/officeart/2005/8/layout/orgChart1"/>
+    <dgm:cxn modelId="{090A6A57-FC51-431A-8305-2986E4358C8A}" type="presOf" srcId="{9372CC14-96CC-4066-8C00-295F16D627EC}" destId="{1E00106C-7E14-4B93-B16C-C744F71B18A8}" srcOrd="0" destOrd="0" presId="urn:microsoft.com/office/officeart/2005/8/layout/orgChart1"/>
+    <dgm:cxn modelId="{CB938591-3C80-420E-8ABF-53D1C15116AD}" srcId="{9372CC14-96CC-4066-8C00-295F16D627EC}" destId="{502E8B4F-35A6-47D4-A4E4-F9EC393F64A2}" srcOrd="0" destOrd="0" parTransId="{6609A656-C1C6-4EF9-A01D-53AD9AC12958}" sibTransId="{4314E6BB-B946-476F-8B64-E84346DF0CB4}"/>
+    <dgm:cxn modelId="{54297E9A-8D30-443C-AC34-D56D072D01B0}" srcId="{E66DF6A1-FDCB-4BB0-8D52-5EAE31044073}" destId="{19BC2258-1378-4783-92CF-43C08D842F16}" srcOrd="0" destOrd="0" parTransId="{8CB4D802-A8D8-453A-8745-3D03476EB9C4}" sibTransId="{5A0AEEFC-CA49-4EBA-B97A-7A7E61E1A647}"/>
+    <dgm:cxn modelId="{C5D3509F-19CE-49FD-8ED3-96426FF68D5D}" type="presOf" srcId="{502E8B4F-35A6-47D4-A4E4-F9EC393F64A2}" destId="{1E7ADEFE-DBD8-4707-9475-0D566A424095}" srcOrd="0" destOrd="0" presId="urn:microsoft.com/office/officeart/2005/8/layout/orgChart1"/>
+    <dgm:cxn modelId="{173CC0BE-6B64-4250-A7F1-BB999F5C2E16}" type="presOf" srcId="{A7181CF2-5F4F-4A43-BEAE-2D21212C1B93}" destId="{36D67EB5-4C2E-4369-8138-50DAF62EF1BA}" srcOrd="0" destOrd="0" presId="urn:microsoft.com/office/officeart/2005/8/layout/orgChart1"/>
+    <dgm:cxn modelId="{60599EE1-B73F-4799-A14A-59BF024052D9}" type="presOf" srcId="{19BC2258-1378-4783-92CF-43C08D842F16}" destId="{F42FF6AA-7714-4319-91CA-85C28EAA236C}" srcOrd="0" destOrd="0" presId="urn:microsoft.com/office/officeart/2005/8/layout/orgChart1"/>
     <dgm:cxn modelId="{19451BE3-5500-434B-869A-D582B736C14C}" type="presOf" srcId="{A7181CF2-5F4F-4A43-BEAE-2D21212C1B93}" destId="{04E5964E-6F5F-40CE-A554-1013C0BB4C0E}" srcOrd="1" destOrd="0" presId="urn:microsoft.com/office/officeart/2005/8/layout/orgChart1"/>
-    <dgm:cxn modelId="{48796723-A78A-455C-943C-1354583F497F}" srcId="{502E8B4F-35A6-47D4-A4E4-F9EC393F64A2}" destId="{A7181CF2-5F4F-4A43-BEAE-2D21212C1B93}" srcOrd="0" destOrd="0" parTransId="{0D7A434D-CCED-4734-893A-23488F39B4DE}" sibTransId="{520544C9-4F1E-4AB2-96BE-BE9EB76543E7}"/>
-    <dgm:cxn modelId="{3BA64F17-A8ED-4456-9EE4-6B353CE47834}" type="presOf" srcId="{502E8B4F-35A6-47D4-A4E4-F9EC393F64A2}" destId="{457987E4-2239-4423-AB6B-04B1394DFE58}" srcOrd="1" destOrd="0" presId="urn:microsoft.com/office/officeart/2005/8/layout/orgChart1"/>
-    <dgm:cxn modelId="{82A0196D-1A8D-4BFF-BD1D-8425BE4F2C5E}" type="presOf" srcId="{19BC2258-1378-4783-92CF-43C08D842F16}" destId="{4DAF996E-A868-442E-8162-F5C6317EA988}" srcOrd="1" destOrd="0" presId="urn:microsoft.com/office/officeart/2005/8/layout/orgChart1"/>
-    <dgm:cxn modelId="{C5D3509F-19CE-49FD-8ED3-96426FF68D5D}" type="presOf" srcId="{502E8B4F-35A6-47D4-A4E4-F9EC393F64A2}" destId="{1E7ADEFE-DBD8-4707-9475-0D566A424095}" srcOrd="0" destOrd="0" presId="urn:microsoft.com/office/officeart/2005/8/layout/orgChart1"/>
-    <dgm:cxn modelId="{60599EE1-B73F-4799-A14A-59BF024052D9}" type="presOf" srcId="{19BC2258-1378-4783-92CF-43C08D842F16}" destId="{F42FF6AA-7714-4319-91CA-85C28EAA236C}" srcOrd="0" destOrd="0" presId="urn:microsoft.com/office/officeart/2005/8/layout/orgChart1"/>
-    <dgm:cxn modelId="{3D373C31-8FEC-4DD6-88DF-4F0B048FBFFC}" srcId="{19BC2258-1378-4783-92CF-43C08D842F16}" destId="{9372CC14-96CC-4066-8C00-295F16D627EC}" srcOrd="0" destOrd="0" parTransId="{C0D7C41E-7F8A-4C0F-A887-175F317E6C89}" sibTransId="{A9D3B2D7-2DEF-4E2E-9A6C-D748F0389C15}"/>
-    <dgm:cxn modelId="{CB938591-3C80-420E-8ABF-53D1C15116AD}" srcId="{9372CC14-96CC-4066-8C00-295F16D627EC}" destId="{502E8B4F-35A6-47D4-A4E4-F9EC393F64A2}" srcOrd="0" destOrd="0" parTransId="{6609A656-C1C6-4EF9-A01D-53AD9AC12958}" sibTransId="{4314E6BB-B946-476F-8B64-E84346DF0CB4}"/>
-    <dgm:cxn modelId="{A9A18A35-C084-4871-9D21-8D2738B9FC89}" type="presOf" srcId="{E66DF6A1-FDCB-4BB0-8D52-5EAE31044073}" destId="{0E0FBBFC-3721-4238-B19A-4906734F0ADA}" srcOrd="0" destOrd="0" presId="urn:microsoft.com/office/officeart/2005/8/layout/orgChart1"/>
-    <dgm:cxn modelId="{995EC76A-184D-4941-AA1B-8C865B0BA753}" type="presOf" srcId="{0D7A434D-CCED-4734-893A-23488F39B4DE}" destId="{81887688-5C12-43E8-94CE-58B89BBFF3AF}" srcOrd="0" destOrd="0" presId="urn:microsoft.com/office/officeart/2005/8/layout/orgChart1"/>
-    <dgm:cxn modelId="{4C937965-C979-49F1-B5A0-692F9FEA9E60}" type="presOf" srcId="{9372CC14-96CC-4066-8C00-295F16D627EC}" destId="{6344572F-E519-4584-AE7E-38856334C02C}" srcOrd="1" destOrd="0" presId="urn:microsoft.com/office/officeart/2005/8/layout/orgChart1"/>
-    <dgm:cxn modelId="{173CC0BE-6B64-4250-A7F1-BB999F5C2E16}" type="presOf" srcId="{A7181CF2-5F4F-4A43-BEAE-2D21212C1B93}" destId="{36D67EB5-4C2E-4369-8138-50DAF62EF1BA}" srcOrd="0" destOrd="0" presId="urn:microsoft.com/office/officeart/2005/8/layout/orgChart1"/>
-    <dgm:cxn modelId="{090A6A57-FC51-431A-8305-2986E4358C8A}" type="presOf" srcId="{9372CC14-96CC-4066-8C00-295F16D627EC}" destId="{1E00106C-7E14-4B93-B16C-C744F71B18A8}" srcOrd="0" destOrd="0" presId="urn:microsoft.com/office/officeart/2005/8/layout/orgChart1"/>
-    <dgm:cxn modelId="{54297E9A-8D30-443C-AC34-D56D072D01B0}" srcId="{E66DF6A1-FDCB-4BB0-8D52-5EAE31044073}" destId="{19BC2258-1378-4783-92CF-43C08D842F16}" srcOrd="0" destOrd="0" parTransId="{8CB4D802-A8D8-453A-8745-3D03476EB9C4}" sibTransId="{5A0AEEFC-CA49-4EBA-B97A-7A7E61E1A647}"/>
     <dgm:cxn modelId="{47A7ABFE-826E-4540-9202-7DF34DBFFC82}" type="presOf" srcId="{6609A656-C1C6-4EF9-A01D-53AD9AC12958}" destId="{39165F29-C233-4038-84F6-8E9E65F1C269}" srcOrd="0" destOrd="0" presId="urn:microsoft.com/office/officeart/2005/8/layout/orgChart1"/>
     <dgm:cxn modelId="{36A45D67-C78D-4C88-B397-F59EC3F3C221}" type="presParOf" srcId="{0E0FBBFC-3721-4238-B19A-4906734F0ADA}" destId="{9EE5B969-F25F-45BE-B520-7AD4BC6C515C}" srcOrd="0" destOrd="0" presId="urn:microsoft.com/office/officeart/2005/8/layout/orgChart1"/>
     <dgm:cxn modelId="{8EC60BC6-EAD8-4C18-8B7E-9C107EFFB3FD}" type="presParOf" srcId="{9EE5B969-F25F-45BE-B520-7AD4BC6C515C}" destId="{6C2922E1-79C1-4E0E-9866-59CC7D74CA60}" srcOrd="0" destOrd="0" presId="urn:microsoft.com/office/officeart/2005/8/layout/orgChart1"/>
@@ -2088,10 +2004,9 @@
         <a:lstStyle/>
         <a:p>
           <a:r>
-            <a:rPr lang="en-US" dirty="0" smtClean="0"/>
+            <a:rPr lang="en-US" dirty="0"/>
             <a:t>C-level Executives</a:t>
           </a:r>
-          <a:endParaRPr lang="en-US" dirty="0"/>
         </a:p>
       </dgm:t>
     </dgm:pt>
@@ -2125,10 +2040,9 @@
         <a:lstStyle/>
         <a:p>
           <a:r>
-            <a:rPr lang="en-US" dirty="0" smtClean="0"/>
+            <a:rPr lang="en-US" dirty="0"/>
             <a:t>Mid-level Managers</a:t>
           </a:r>
-          <a:endParaRPr lang="en-US" dirty="0"/>
         </a:p>
       </dgm:t>
     </dgm:pt>
@@ -2162,10 +2076,9 @@
         <a:lstStyle/>
         <a:p>
           <a:r>
-            <a:rPr lang="en-US" dirty="0" smtClean="0"/>
+            <a:rPr lang="en-US" dirty="0"/>
             <a:t>Low-level Managers</a:t>
           </a:r>
-          <a:endParaRPr lang="en-US" dirty="0"/>
         </a:p>
       </dgm:t>
     </dgm:pt>
@@ -2199,10 +2112,9 @@
         <a:lstStyle/>
         <a:p>
           <a:r>
-            <a:rPr lang="en-US" dirty="0" smtClean="0"/>
+            <a:rPr lang="en-US" dirty="0"/>
             <a:t>Customers</a:t>
           </a:r>
-          <a:endParaRPr lang="en-US" dirty="0"/>
         </a:p>
       </dgm:t>
     </dgm:pt>
@@ -2240,13 +2152,6 @@
         </dgm:presLayoutVars>
       </dgm:prSet>
       <dgm:spPr/>
-      <dgm:t>
-        <a:bodyPr/>
-        <a:lstStyle/>
-        <a:p>
-          <a:endParaRPr lang="en-US"/>
-        </a:p>
-      </dgm:t>
     </dgm:pt>
     <dgm:pt modelId="{9EE5B969-F25F-45BE-B520-7AD4BC6C515C}" type="pres">
       <dgm:prSet presAssocID="{19BC2258-1378-4783-92CF-43C08D842F16}" presName="hierRoot1" presStyleCnt="0">
@@ -2267,24 +2172,10 @@
         </dgm:presLayoutVars>
       </dgm:prSet>
       <dgm:spPr/>
-      <dgm:t>
-        <a:bodyPr/>
-        <a:lstStyle/>
-        <a:p>
-          <a:endParaRPr lang="en-US"/>
-        </a:p>
-      </dgm:t>
     </dgm:pt>
     <dgm:pt modelId="{4DAF996E-A868-442E-8162-F5C6317EA988}" type="pres">
       <dgm:prSet presAssocID="{19BC2258-1378-4783-92CF-43C08D842F16}" presName="rootConnector1" presStyleLbl="node1" presStyleIdx="0" presStyleCnt="0"/>
       <dgm:spPr/>
-      <dgm:t>
-        <a:bodyPr/>
-        <a:lstStyle/>
-        <a:p>
-          <a:endParaRPr lang="en-US"/>
-        </a:p>
-      </dgm:t>
     </dgm:pt>
     <dgm:pt modelId="{DBA14755-1466-4B62-B5FB-C6BA5704785A}" type="pres">
       <dgm:prSet presAssocID="{19BC2258-1378-4783-92CF-43C08D842F16}" presName="hierChild2" presStyleCnt="0"/>
@@ -2297,13 +2188,6 @@
     <dgm:pt modelId="{1E81F0C9-25DE-484E-BC23-804DCCDC7033}" type="pres">
       <dgm:prSet presAssocID="{C0D7C41E-7F8A-4C0F-A887-175F317E6C89}" presName="Name111" presStyleLbl="parChTrans1D2" presStyleIdx="0" presStyleCnt="1"/>
       <dgm:spPr/>
-      <dgm:t>
-        <a:bodyPr/>
-        <a:lstStyle/>
-        <a:p>
-          <a:endParaRPr lang="en-US"/>
-        </a:p>
-      </dgm:t>
     </dgm:pt>
     <dgm:pt modelId="{CA52EDD0-C08E-4E29-96A1-C7B6C4752BF0}" type="pres">
       <dgm:prSet presAssocID="{9372CC14-96CC-4066-8C00-295F16D627EC}" presName="hierRoot3" presStyleCnt="0">
@@ -2324,24 +2208,10 @@
         </dgm:presLayoutVars>
       </dgm:prSet>
       <dgm:spPr/>
-      <dgm:t>
-        <a:bodyPr/>
-        <a:lstStyle/>
-        <a:p>
-          <a:endParaRPr lang="en-US"/>
-        </a:p>
-      </dgm:t>
     </dgm:pt>
     <dgm:pt modelId="{6344572F-E519-4584-AE7E-38856334C02C}" type="pres">
       <dgm:prSet presAssocID="{9372CC14-96CC-4066-8C00-295F16D627EC}" presName="rootConnector3" presStyleLbl="asst1" presStyleIdx="0" presStyleCnt="3"/>
       <dgm:spPr/>
-      <dgm:t>
-        <a:bodyPr/>
-        <a:lstStyle/>
-        <a:p>
-          <a:endParaRPr lang="en-US"/>
-        </a:p>
-      </dgm:t>
     </dgm:pt>
     <dgm:pt modelId="{36F1CD3D-5F21-4F13-BEF8-5141B047FB67}" type="pres">
       <dgm:prSet presAssocID="{9372CC14-96CC-4066-8C00-295F16D627EC}" presName="hierChild6" presStyleCnt="0"/>
@@ -2354,13 +2224,6 @@
     <dgm:pt modelId="{39165F29-C233-4038-84F6-8E9E65F1C269}" type="pres">
       <dgm:prSet presAssocID="{6609A656-C1C6-4EF9-A01D-53AD9AC12958}" presName="Name111" presStyleLbl="parChTrans1D3" presStyleIdx="0" presStyleCnt="1"/>
       <dgm:spPr/>
-      <dgm:t>
-        <a:bodyPr/>
-        <a:lstStyle/>
-        <a:p>
-          <a:endParaRPr lang="en-US"/>
-        </a:p>
-      </dgm:t>
     </dgm:pt>
     <dgm:pt modelId="{3F7DAA5F-B10D-45FE-A39C-A53A95622F99}" type="pres">
       <dgm:prSet presAssocID="{502E8B4F-35A6-47D4-A4E4-F9EC393F64A2}" presName="hierRoot3" presStyleCnt="0">
@@ -2381,24 +2244,10 @@
         </dgm:presLayoutVars>
       </dgm:prSet>
       <dgm:spPr/>
-      <dgm:t>
-        <a:bodyPr/>
-        <a:lstStyle/>
-        <a:p>
-          <a:endParaRPr lang="en-US"/>
-        </a:p>
-      </dgm:t>
     </dgm:pt>
     <dgm:pt modelId="{457987E4-2239-4423-AB6B-04B1394DFE58}" type="pres">
       <dgm:prSet presAssocID="{502E8B4F-35A6-47D4-A4E4-F9EC393F64A2}" presName="rootConnector3" presStyleLbl="asst1" presStyleIdx="1" presStyleCnt="3"/>
       <dgm:spPr/>
-      <dgm:t>
-        <a:bodyPr/>
-        <a:lstStyle/>
-        <a:p>
-          <a:endParaRPr lang="en-US"/>
-        </a:p>
-      </dgm:t>
     </dgm:pt>
     <dgm:pt modelId="{60994875-6EFF-49C4-837A-3C75425978CF}" type="pres">
       <dgm:prSet presAssocID="{502E8B4F-35A6-47D4-A4E4-F9EC393F64A2}" presName="hierChild6" presStyleCnt="0"/>
@@ -2411,13 +2260,6 @@
     <dgm:pt modelId="{81887688-5C12-43E8-94CE-58B89BBFF3AF}" type="pres">
       <dgm:prSet presAssocID="{0D7A434D-CCED-4734-893A-23488F39B4DE}" presName="Name111" presStyleLbl="parChTrans1D4" presStyleIdx="0" presStyleCnt="1"/>
       <dgm:spPr/>
-      <dgm:t>
-        <a:bodyPr/>
-        <a:lstStyle/>
-        <a:p>
-          <a:endParaRPr lang="en-US"/>
-        </a:p>
-      </dgm:t>
     </dgm:pt>
     <dgm:pt modelId="{1E629F54-3DC7-4945-ACA7-75907A79FA15}" type="pres">
       <dgm:prSet presAssocID="{A7181CF2-5F4F-4A43-BEAE-2D21212C1B93}" presName="hierRoot3" presStyleCnt="0">
@@ -2438,24 +2280,10 @@
         </dgm:presLayoutVars>
       </dgm:prSet>
       <dgm:spPr/>
-      <dgm:t>
-        <a:bodyPr/>
-        <a:lstStyle/>
-        <a:p>
-          <a:endParaRPr lang="en-US"/>
-        </a:p>
-      </dgm:t>
     </dgm:pt>
     <dgm:pt modelId="{04E5964E-6F5F-40CE-A554-1013C0BB4C0E}" type="pres">
       <dgm:prSet presAssocID="{A7181CF2-5F4F-4A43-BEAE-2D21212C1B93}" presName="rootConnector3" presStyleLbl="asst1" presStyleIdx="2" presStyleCnt="3"/>
       <dgm:spPr/>
-      <dgm:t>
-        <a:bodyPr/>
-        <a:lstStyle/>
-        <a:p>
-          <a:endParaRPr lang="en-US"/>
-        </a:p>
-      </dgm:t>
     </dgm:pt>
     <dgm:pt modelId="{1411F933-38BB-4BA0-96A0-0D9A8CD3E8CE}" type="pres">
       <dgm:prSet presAssocID="{A7181CF2-5F4F-4A43-BEAE-2D21212C1B93}" presName="hierChild6" presStyleCnt="0"/>
@@ -2467,22 +2295,22 @@
     </dgm:pt>
   </dgm:ptLst>
   <dgm:cxnLst>
-    <dgm:cxn modelId="{4C937965-C979-49F1-B5A0-692F9FEA9E60}" type="presOf" srcId="{9372CC14-96CC-4066-8C00-295F16D627EC}" destId="{6344572F-E519-4584-AE7E-38856334C02C}" srcOrd="1" destOrd="0" presId="urn:microsoft.com/office/officeart/2005/8/layout/orgChart1"/>
-    <dgm:cxn modelId="{60599EE1-B73F-4799-A14A-59BF024052D9}" type="presOf" srcId="{19BC2258-1378-4783-92CF-43C08D842F16}" destId="{F42FF6AA-7714-4319-91CA-85C28EAA236C}" srcOrd="0" destOrd="0" presId="urn:microsoft.com/office/officeart/2005/8/layout/orgChart1"/>
-    <dgm:cxn modelId="{899AB474-B25B-43D0-98DE-795AA934B516}" type="presOf" srcId="{C0D7C41E-7F8A-4C0F-A887-175F317E6C89}" destId="{1E81F0C9-25DE-484E-BC23-804DCCDC7033}" srcOrd="0" destOrd="0" presId="urn:microsoft.com/office/officeart/2005/8/layout/orgChart1"/>
+    <dgm:cxn modelId="{3BA64F17-A8ED-4456-9EE4-6B353CE47834}" type="presOf" srcId="{502E8B4F-35A6-47D4-A4E4-F9EC393F64A2}" destId="{457987E4-2239-4423-AB6B-04B1394DFE58}" srcOrd="1" destOrd="0" presId="urn:microsoft.com/office/officeart/2005/8/layout/orgChart1"/>
+    <dgm:cxn modelId="{48796723-A78A-455C-943C-1354583F497F}" srcId="{502E8B4F-35A6-47D4-A4E4-F9EC393F64A2}" destId="{A7181CF2-5F4F-4A43-BEAE-2D21212C1B93}" srcOrd="0" destOrd="0" parTransId="{0D7A434D-CCED-4734-893A-23488F39B4DE}" sibTransId="{520544C9-4F1E-4AB2-96BE-BE9EB76543E7}"/>
     <dgm:cxn modelId="{3D373C31-8FEC-4DD6-88DF-4F0B048FBFFC}" srcId="{19BC2258-1378-4783-92CF-43C08D842F16}" destId="{9372CC14-96CC-4066-8C00-295F16D627EC}" srcOrd="0" destOrd="0" parTransId="{C0D7C41E-7F8A-4C0F-A887-175F317E6C89}" sibTransId="{A9D3B2D7-2DEF-4E2E-9A6C-D748F0389C15}"/>
     <dgm:cxn modelId="{A9A18A35-C084-4871-9D21-8D2738B9FC89}" type="presOf" srcId="{E66DF6A1-FDCB-4BB0-8D52-5EAE31044073}" destId="{0E0FBBFC-3721-4238-B19A-4906734F0ADA}" srcOrd="0" destOrd="0" presId="urn:microsoft.com/office/officeart/2005/8/layout/orgChart1"/>
+    <dgm:cxn modelId="{4C937965-C979-49F1-B5A0-692F9FEA9E60}" type="presOf" srcId="{9372CC14-96CC-4066-8C00-295F16D627EC}" destId="{6344572F-E519-4584-AE7E-38856334C02C}" srcOrd="1" destOrd="0" presId="urn:microsoft.com/office/officeart/2005/8/layout/orgChart1"/>
+    <dgm:cxn modelId="{995EC76A-184D-4941-AA1B-8C865B0BA753}" type="presOf" srcId="{0D7A434D-CCED-4734-893A-23488F39B4DE}" destId="{81887688-5C12-43E8-94CE-58B89BBFF3AF}" srcOrd="0" destOrd="0" presId="urn:microsoft.com/office/officeart/2005/8/layout/orgChart1"/>
+    <dgm:cxn modelId="{82A0196D-1A8D-4BFF-BD1D-8425BE4F2C5E}" type="presOf" srcId="{19BC2258-1378-4783-92CF-43C08D842F16}" destId="{4DAF996E-A868-442E-8162-F5C6317EA988}" srcOrd="1" destOrd="0" presId="urn:microsoft.com/office/officeart/2005/8/layout/orgChart1"/>
+    <dgm:cxn modelId="{899AB474-B25B-43D0-98DE-795AA934B516}" type="presOf" srcId="{C0D7C41E-7F8A-4C0F-A887-175F317E6C89}" destId="{1E81F0C9-25DE-484E-BC23-804DCCDC7033}" srcOrd="0" destOrd="0" presId="urn:microsoft.com/office/officeart/2005/8/layout/orgChart1"/>
+    <dgm:cxn modelId="{090A6A57-FC51-431A-8305-2986E4358C8A}" type="presOf" srcId="{9372CC14-96CC-4066-8C00-295F16D627EC}" destId="{1E00106C-7E14-4B93-B16C-C744F71B18A8}" srcOrd="0" destOrd="0" presId="urn:microsoft.com/office/officeart/2005/8/layout/orgChart1"/>
+    <dgm:cxn modelId="{CB938591-3C80-420E-8ABF-53D1C15116AD}" srcId="{9372CC14-96CC-4066-8C00-295F16D627EC}" destId="{502E8B4F-35A6-47D4-A4E4-F9EC393F64A2}" srcOrd="0" destOrd="0" parTransId="{6609A656-C1C6-4EF9-A01D-53AD9AC12958}" sibTransId="{4314E6BB-B946-476F-8B64-E84346DF0CB4}"/>
+    <dgm:cxn modelId="{54297E9A-8D30-443C-AC34-D56D072D01B0}" srcId="{E66DF6A1-FDCB-4BB0-8D52-5EAE31044073}" destId="{19BC2258-1378-4783-92CF-43C08D842F16}" srcOrd="0" destOrd="0" parTransId="{8CB4D802-A8D8-453A-8745-3D03476EB9C4}" sibTransId="{5A0AEEFC-CA49-4EBA-B97A-7A7E61E1A647}"/>
+    <dgm:cxn modelId="{C5D3509F-19CE-49FD-8ED3-96426FF68D5D}" type="presOf" srcId="{502E8B4F-35A6-47D4-A4E4-F9EC393F64A2}" destId="{1E7ADEFE-DBD8-4707-9475-0D566A424095}" srcOrd="0" destOrd="0" presId="urn:microsoft.com/office/officeart/2005/8/layout/orgChart1"/>
+    <dgm:cxn modelId="{173CC0BE-6B64-4250-A7F1-BB999F5C2E16}" type="presOf" srcId="{A7181CF2-5F4F-4A43-BEAE-2D21212C1B93}" destId="{36D67EB5-4C2E-4369-8138-50DAF62EF1BA}" srcOrd="0" destOrd="0" presId="urn:microsoft.com/office/officeart/2005/8/layout/orgChart1"/>
+    <dgm:cxn modelId="{60599EE1-B73F-4799-A14A-59BF024052D9}" type="presOf" srcId="{19BC2258-1378-4783-92CF-43C08D842F16}" destId="{F42FF6AA-7714-4319-91CA-85C28EAA236C}" srcOrd="0" destOrd="0" presId="urn:microsoft.com/office/officeart/2005/8/layout/orgChart1"/>
+    <dgm:cxn modelId="{19451BE3-5500-434B-869A-D582B736C14C}" type="presOf" srcId="{A7181CF2-5F4F-4A43-BEAE-2D21212C1B93}" destId="{04E5964E-6F5F-40CE-A554-1013C0BB4C0E}" srcOrd="1" destOrd="0" presId="urn:microsoft.com/office/officeart/2005/8/layout/orgChart1"/>
     <dgm:cxn modelId="{47A7ABFE-826E-4540-9202-7DF34DBFFC82}" type="presOf" srcId="{6609A656-C1C6-4EF9-A01D-53AD9AC12958}" destId="{39165F29-C233-4038-84F6-8E9E65F1C269}" srcOrd="0" destOrd="0" presId="urn:microsoft.com/office/officeart/2005/8/layout/orgChart1"/>
-    <dgm:cxn modelId="{090A6A57-FC51-431A-8305-2986E4358C8A}" type="presOf" srcId="{9372CC14-96CC-4066-8C00-295F16D627EC}" destId="{1E00106C-7E14-4B93-B16C-C744F71B18A8}" srcOrd="0" destOrd="0" presId="urn:microsoft.com/office/officeart/2005/8/layout/orgChart1"/>
-    <dgm:cxn modelId="{173CC0BE-6B64-4250-A7F1-BB999F5C2E16}" type="presOf" srcId="{A7181CF2-5F4F-4A43-BEAE-2D21212C1B93}" destId="{36D67EB5-4C2E-4369-8138-50DAF62EF1BA}" srcOrd="0" destOrd="0" presId="urn:microsoft.com/office/officeart/2005/8/layout/orgChart1"/>
-    <dgm:cxn modelId="{3BA64F17-A8ED-4456-9EE4-6B353CE47834}" type="presOf" srcId="{502E8B4F-35A6-47D4-A4E4-F9EC393F64A2}" destId="{457987E4-2239-4423-AB6B-04B1394DFE58}" srcOrd="1" destOrd="0" presId="urn:microsoft.com/office/officeart/2005/8/layout/orgChart1"/>
-    <dgm:cxn modelId="{C5D3509F-19CE-49FD-8ED3-96426FF68D5D}" type="presOf" srcId="{502E8B4F-35A6-47D4-A4E4-F9EC393F64A2}" destId="{1E7ADEFE-DBD8-4707-9475-0D566A424095}" srcOrd="0" destOrd="0" presId="urn:microsoft.com/office/officeart/2005/8/layout/orgChart1"/>
-    <dgm:cxn modelId="{82A0196D-1A8D-4BFF-BD1D-8425BE4F2C5E}" type="presOf" srcId="{19BC2258-1378-4783-92CF-43C08D842F16}" destId="{4DAF996E-A868-442E-8162-F5C6317EA988}" srcOrd="1" destOrd="0" presId="urn:microsoft.com/office/officeart/2005/8/layout/orgChart1"/>
-    <dgm:cxn modelId="{CB938591-3C80-420E-8ABF-53D1C15116AD}" srcId="{9372CC14-96CC-4066-8C00-295F16D627EC}" destId="{502E8B4F-35A6-47D4-A4E4-F9EC393F64A2}" srcOrd="0" destOrd="0" parTransId="{6609A656-C1C6-4EF9-A01D-53AD9AC12958}" sibTransId="{4314E6BB-B946-476F-8B64-E84346DF0CB4}"/>
-    <dgm:cxn modelId="{48796723-A78A-455C-943C-1354583F497F}" srcId="{502E8B4F-35A6-47D4-A4E4-F9EC393F64A2}" destId="{A7181CF2-5F4F-4A43-BEAE-2D21212C1B93}" srcOrd="0" destOrd="0" parTransId="{0D7A434D-CCED-4734-893A-23488F39B4DE}" sibTransId="{520544C9-4F1E-4AB2-96BE-BE9EB76543E7}"/>
-    <dgm:cxn modelId="{54297E9A-8D30-443C-AC34-D56D072D01B0}" srcId="{E66DF6A1-FDCB-4BB0-8D52-5EAE31044073}" destId="{19BC2258-1378-4783-92CF-43C08D842F16}" srcOrd="0" destOrd="0" parTransId="{8CB4D802-A8D8-453A-8745-3D03476EB9C4}" sibTransId="{5A0AEEFC-CA49-4EBA-B97A-7A7E61E1A647}"/>
-    <dgm:cxn modelId="{19451BE3-5500-434B-869A-D582B736C14C}" type="presOf" srcId="{A7181CF2-5F4F-4A43-BEAE-2D21212C1B93}" destId="{04E5964E-6F5F-40CE-A554-1013C0BB4C0E}" srcOrd="1" destOrd="0" presId="urn:microsoft.com/office/officeart/2005/8/layout/orgChart1"/>
-    <dgm:cxn modelId="{995EC76A-184D-4941-AA1B-8C865B0BA753}" type="presOf" srcId="{0D7A434D-CCED-4734-893A-23488F39B4DE}" destId="{81887688-5C12-43E8-94CE-58B89BBFF3AF}" srcOrd="0" destOrd="0" presId="urn:microsoft.com/office/officeart/2005/8/layout/orgChart1"/>
     <dgm:cxn modelId="{36A45D67-C78D-4C88-B397-F59EC3F3C221}" type="presParOf" srcId="{0E0FBBFC-3721-4238-B19A-4906734F0ADA}" destId="{9EE5B969-F25F-45BE-B520-7AD4BC6C515C}" srcOrd="0" destOrd="0" presId="urn:microsoft.com/office/officeart/2005/8/layout/orgChart1"/>
     <dgm:cxn modelId="{8EC60BC6-EAD8-4C18-8B7E-9C107EFFB3FD}" type="presParOf" srcId="{9EE5B969-F25F-45BE-B520-7AD4BC6C515C}" destId="{6C2922E1-79C1-4E0E-9866-59CC7D74CA60}" srcOrd="0" destOrd="0" presId="urn:microsoft.com/office/officeart/2005/8/layout/orgChart1"/>
     <dgm:cxn modelId="{01D28403-2DE4-4867-A3C9-4BD653E950B8}" type="presParOf" srcId="{6C2922E1-79C1-4E0E-9866-59CC7D74CA60}" destId="{F42FF6AA-7714-4319-91CA-85C28EAA236C}" srcOrd="0" destOrd="0" presId="urn:microsoft.com/office/officeart/2005/8/layout/orgChart1"/>
@@ -2761,7 +2589,7 @@
         </a:bodyPr>
         <a:lstStyle/>
         <a:p>
-          <a:pPr lvl="0" algn="ctr" defTabSz="1911350">
+          <a:pPr marL="0" lvl="0" indent="0" algn="ctr" defTabSz="1911350">
             <a:lnSpc>
               <a:spcPct val="90000"/>
             </a:lnSpc>
@@ -2771,12 +2599,12 @@
             <a:spcAft>
               <a:spcPct val="35000"/>
             </a:spcAft>
+            <a:buNone/>
           </a:pPr>
           <a:r>
-            <a:rPr lang="en-US" sz="4300" kern="1200" dirty="0" smtClean="0"/>
+            <a:rPr lang="en-US" sz="4300" kern="1200" dirty="0"/>
             <a:t>C-level Executives</a:t>
           </a:r>
-          <a:endParaRPr lang="en-US" sz="4300" kern="1200" dirty="0"/>
         </a:p>
       </dsp:txBody>
       <dsp:txXfrm>
@@ -2839,7 +2667,7 @@
         </a:bodyPr>
         <a:lstStyle/>
         <a:p>
-          <a:pPr lvl="0" algn="ctr" defTabSz="1911350">
+          <a:pPr marL="0" lvl="0" indent="0" algn="ctr" defTabSz="1911350">
             <a:lnSpc>
               <a:spcPct val="90000"/>
             </a:lnSpc>
@@ -2849,12 +2677,12 @@
             <a:spcAft>
               <a:spcPct val="35000"/>
             </a:spcAft>
+            <a:buNone/>
           </a:pPr>
           <a:r>
-            <a:rPr lang="en-US" sz="4300" kern="1200" dirty="0" smtClean="0"/>
+            <a:rPr lang="en-US" sz="4300" kern="1200" dirty="0"/>
             <a:t>Mid-level Managers</a:t>
           </a:r>
-          <a:endParaRPr lang="en-US" sz="4300" kern="1200" dirty="0"/>
         </a:p>
       </dsp:txBody>
       <dsp:txXfrm>
@@ -2917,7 +2745,7 @@
         </a:bodyPr>
         <a:lstStyle/>
         <a:p>
-          <a:pPr lvl="0" algn="ctr" defTabSz="1911350">
+          <a:pPr marL="0" lvl="0" indent="0" algn="ctr" defTabSz="1911350">
             <a:lnSpc>
               <a:spcPct val="90000"/>
             </a:lnSpc>
@@ -2927,12 +2755,12 @@
             <a:spcAft>
               <a:spcPct val="35000"/>
             </a:spcAft>
+            <a:buNone/>
           </a:pPr>
           <a:r>
-            <a:rPr lang="en-US" sz="4300" kern="1200" dirty="0" smtClean="0"/>
+            <a:rPr lang="en-US" sz="4300" kern="1200" dirty="0"/>
             <a:t>Low-level Managers</a:t>
           </a:r>
-          <a:endParaRPr lang="en-US" sz="4300" kern="1200" dirty="0"/>
         </a:p>
       </dsp:txBody>
       <dsp:txXfrm>
@@ -2995,7 +2823,7 @@
         </a:bodyPr>
         <a:lstStyle/>
         <a:p>
-          <a:pPr lvl="0" algn="ctr" defTabSz="1911350">
+          <a:pPr marL="0" lvl="0" indent="0" algn="ctr" defTabSz="1911350">
             <a:lnSpc>
               <a:spcPct val="90000"/>
             </a:lnSpc>
@@ -3005,12 +2833,12 @@
             <a:spcAft>
               <a:spcPct val="35000"/>
             </a:spcAft>
+            <a:buNone/>
           </a:pPr>
           <a:r>
-            <a:rPr lang="en-US" sz="4300" kern="1200" dirty="0" smtClean="0"/>
+            <a:rPr lang="en-US" sz="4300" kern="1200" dirty="0"/>
             <a:t>Customers</a:t>
           </a:r>
-          <a:endParaRPr lang="en-US" sz="4300" kern="1200" dirty="0"/>
         </a:p>
       </dsp:txBody>
       <dsp:txXfrm>
@@ -3262,7 +3090,7 @@
         </a:bodyPr>
         <a:lstStyle/>
         <a:p>
-          <a:pPr lvl="0" algn="ctr" defTabSz="1911350">
+          <a:pPr marL="0" lvl="0" indent="0" algn="ctr" defTabSz="1911350">
             <a:lnSpc>
               <a:spcPct val="90000"/>
             </a:lnSpc>
@@ -3272,12 +3100,12 @@
             <a:spcAft>
               <a:spcPct val="35000"/>
             </a:spcAft>
+            <a:buNone/>
           </a:pPr>
           <a:r>
-            <a:rPr lang="en-US" sz="4300" kern="1200" dirty="0" smtClean="0"/>
+            <a:rPr lang="en-US" sz="4300" kern="1200" dirty="0"/>
             <a:t>C-level Executives</a:t>
           </a:r>
-          <a:endParaRPr lang="en-US" sz="4300" kern="1200" dirty="0"/>
         </a:p>
       </dsp:txBody>
       <dsp:txXfrm>
@@ -3340,7 +3168,7 @@
         </a:bodyPr>
         <a:lstStyle/>
         <a:p>
-          <a:pPr lvl="0" algn="ctr" defTabSz="1911350">
+          <a:pPr marL="0" lvl="0" indent="0" algn="ctr" defTabSz="1911350">
             <a:lnSpc>
               <a:spcPct val="90000"/>
             </a:lnSpc>
@@ -3350,12 +3178,12 @@
             <a:spcAft>
               <a:spcPct val="35000"/>
             </a:spcAft>
+            <a:buNone/>
           </a:pPr>
           <a:r>
-            <a:rPr lang="en-US" sz="4300" kern="1200" dirty="0" smtClean="0"/>
+            <a:rPr lang="en-US" sz="4300" kern="1200" dirty="0"/>
             <a:t>Mid-level Managers</a:t>
           </a:r>
-          <a:endParaRPr lang="en-US" sz="4300" kern="1200" dirty="0"/>
         </a:p>
       </dsp:txBody>
       <dsp:txXfrm>
@@ -3418,7 +3246,7 @@
         </a:bodyPr>
         <a:lstStyle/>
         <a:p>
-          <a:pPr lvl="0" algn="ctr" defTabSz="1911350">
+          <a:pPr marL="0" lvl="0" indent="0" algn="ctr" defTabSz="1911350">
             <a:lnSpc>
               <a:spcPct val="90000"/>
             </a:lnSpc>
@@ -3428,12 +3256,12 @@
             <a:spcAft>
               <a:spcPct val="35000"/>
             </a:spcAft>
+            <a:buNone/>
           </a:pPr>
           <a:r>
-            <a:rPr lang="en-US" sz="4300" kern="1200" dirty="0" smtClean="0"/>
+            <a:rPr lang="en-US" sz="4300" kern="1200" dirty="0"/>
             <a:t>Low-level Managers</a:t>
           </a:r>
-          <a:endParaRPr lang="en-US" sz="4300" kern="1200" dirty="0"/>
         </a:p>
       </dsp:txBody>
       <dsp:txXfrm>
@@ -3496,7 +3324,7 @@
         </a:bodyPr>
         <a:lstStyle/>
         <a:p>
-          <a:pPr lvl="0" algn="ctr" defTabSz="1911350">
+          <a:pPr marL="0" lvl="0" indent="0" algn="ctr" defTabSz="1911350">
             <a:lnSpc>
               <a:spcPct val="90000"/>
             </a:lnSpc>
@@ -3506,12 +3334,12 @@
             <a:spcAft>
               <a:spcPct val="35000"/>
             </a:spcAft>
+            <a:buNone/>
           </a:pPr>
           <a:r>
-            <a:rPr lang="en-US" sz="4300" kern="1200" dirty="0" smtClean="0"/>
+            <a:rPr lang="en-US" sz="4300" kern="1200" dirty="0"/>
             <a:t>Customers</a:t>
           </a:r>
-          <a:endParaRPr lang="en-US" sz="4300" kern="1200" dirty="0"/>
         </a:p>
       </dsp:txBody>
       <dsp:txXfrm>
@@ -7965,7 +7793,7 @@
           <a:p>
             <a:fld id="{9A34E296-23FB-4FFC-9B3B-C8B342AFE87B}" type="datetimeFigureOut">
               <a:rPr lang="en-US" smtClean="0"/>
-              <a:t>12/1/2017</a:t>
+              <a:t>12/6/2017</a:t>
             </a:fld>
             <a:endParaRPr lang="en-US"/>
           </a:p>
@@ -8029,38 +7857,37 @@
           <a:p>
             <a:pPr lvl="0"/>
             <a:r>
-              <a:rPr lang="en-US" smtClean="0"/>
+              <a:rPr lang="en-US"/>
               <a:t>Edit Master text styles</a:t>
             </a:r>
           </a:p>
           <a:p>
             <a:pPr lvl="1"/>
             <a:r>
-              <a:rPr lang="en-US" smtClean="0"/>
+              <a:rPr lang="en-US"/>
               <a:t>Second level</a:t>
             </a:r>
           </a:p>
           <a:p>
             <a:pPr lvl="2"/>
             <a:r>
-              <a:rPr lang="en-US" smtClean="0"/>
+              <a:rPr lang="en-US"/>
               <a:t>Third level</a:t>
             </a:r>
           </a:p>
           <a:p>
             <a:pPr lvl="3"/>
             <a:r>
-              <a:rPr lang="en-US" smtClean="0"/>
+              <a:rPr lang="en-US"/>
               <a:t>Fourth level</a:t>
             </a:r>
           </a:p>
           <a:p>
             <a:pPr lvl="4"/>
             <a:r>
-              <a:rPr lang="en-US" smtClean="0"/>
+              <a:rPr lang="en-US"/>
               <a:t>Fifth level</a:t>
             </a:r>
-            <a:endParaRPr lang="en-US"/>
           </a:p>
         </p:txBody>
       </p:sp>
@@ -8278,7 +8105,7 @@
           <a:lstStyle/>
           <a:p>
             <a:r>
-              <a:rPr lang="en-US" b="1" dirty="0" smtClean="0">
+              <a:rPr lang="en-US" b="1" dirty="0">
                 <a:solidFill>
                   <a:schemeClr val="tx1"/>
                 </a:solidFill>
@@ -8286,7 +8113,7 @@
               <a:t>Ask</a:t>
             </a:r>
             <a:r>
-              <a:rPr lang="en-US" b="1" baseline="0" dirty="0" smtClean="0">
+              <a:rPr lang="en-US" b="1" baseline="0" dirty="0">
                 <a:solidFill>
                   <a:schemeClr val="tx1"/>
                 </a:solidFill>
@@ -8294,7 +8121,7 @@
               <a:t> Audience: </a:t>
             </a:r>
             <a:r>
-              <a:rPr lang="en-US" dirty="0" smtClean="0">
+              <a:rPr lang="en-US" dirty="0">
                 <a:solidFill>
                   <a:schemeClr val="tx1"/>
                 </a:solidFill>
@@ -8302,7 +8129,7 @@
               <a:t>Does</a:t>
             </a:r>
             <a:r>
-              <a:rPr lang="en-US" baseline="0" dirty="0" smtClean="0">
+              <a:rPr lang="en-US" baseline="0" dirty="0">
                 <a:solidFill>
                   <a:schemeClr val="tx1"/>
                 </a:solidFill>
@@ -8311,7 +8138,7 @@
             </a:r>
           </a:p>
           <a:p>
-            <a:endParaRPr lang="en-US" baseline="0" dirty="0" smtClean="0">
+            <a:endParaRPr lang="en-US" baseline="0" dirty="0">
               <a:solidFill>
                 <a:schemeClr val="tx1"/>
               </a:solidFill>
@@ -8319,7 +8146,7 @@
           </a:p>
           <a:p>
             <a:r>
-              <a:rPr lang="en-US" b="1" baseline="0" dirty="0" smtClean="0">
+              <a:rPr lang="en-US" b="1" baseline="0" dirty="0">
                 <a:solidFill>
                   <a:schemeClr val="tx1"/>
                 </a:solidFill>
@@ -8327,7 +8154,7 @@
               <a:t>Answer:  </a:t>
             </a:r>
             <a:r>
-              <a:rPr lang="en-US" b="0" baseline="0" dirty="0" smtClean="0">
+              <a:rPr lang="en-US" b="0" baseline="0" dirty="0">
                 <a:solidFill>
                   <a:schemeClr val="tx1"/>
                 </a:solidFill>
@@ -8335,7 +8162,7 @@
               <a:t>In </a:t>
             </a:r>
             <a:r>
-              <a:rPr lang="en-US" sz="1200" b="0" i="0" kern="1200" dirty="0" smtClean="0">
+              <a:rPr lang="en-US" sz="1200" b="0" i="0" kern="1200" dirty="0">
                 <a:solidFill>
                   <a:schemeClr val="tx1"/>
                 </a:solidFill>
@@ -8348,7 +8175,7 @@
             </a:r>
           </a:p>
           <a:p>
-            <a:endParaRPr lang="en-US" baseline="0" dirty="0" smtClean="0">
+            <a:endParaRPr lang="en-US" baseline="0" dirty="0">
               <a:solidFill>
                 <a:schemeClr val="tx1"/>
               </a:solidFill>
@@ -8356,7 +8183,7 @@
           </a:p>
           <a:p>
             <a:r>
-              <a:rPr lang="en-US" b="1" baseline="0" dirty="0" smtClean="0">
+              <a:rPr lang="en-US" b="1" baseline="0" dirty="0">
                 <a:solidFill>
                   <a:schemeClr val="tx1"/>
                 </a:solidFill>
@@ -8365,7 +8192,7 @@
             </a:r>
           </a:p>
           <a:p>
-            <a:endParaRPr lang="en-US" baseline="0" dirty="0" smtClean="0">
+            <a:endParaRPr lang="en-US" baseline="0" dirty="0">
               <a:solidFill>
                 <a:schemeClr val="tx1"/>
               </a:solidFill>
@@ -8373,7 +8200,7 @@
           </a:p>
           <a:p>
             <a:r>
-              <a:rPr lang="en-US" baseline="0" dirty="0" smtClean="0">
+              <a:rPr lang="en-US" baseline="0" dirty="0">
                 <a:solidFill>
                   <a:schemeClr val="tx1"/>
                 </a:solidFill>
@@ -8381,7 +8208,7 @@
               <a:t>Wells Fargo CEO John </a:t>
             </a:r>
             <a:r>
-              <a:rPr lang="en-US" baseline="0" dirty="0" err="1" smtClean="0">
+              <a:rPr lang="en-US" baseline="0" dirty="0" err="1">
                 <a:solidFill>
                   <a:schemeClr val="tx1"/>
                 </a:solidFill>
@@ -8389,45 +8216,24 @@
               <a:t>Stumpf</a:t>
             </a:r>
             <a:r>
-              <a:rPr lang="en-US" baseline="0" dirty="0" smtClean="0">
+              <a:rPr lang="en-US" baseline="0" dirty="0">
                 <a:solidFill>
                   <a:schemeClr val="tx1"/>
                 </a:solidFill>
               </a:rPr>
-              <a:t> was </a:t>
+              <a:t> was summoned to testify before U.S. Congress to share what he knew and when he knew it regarding this fraudulent activity.</a:t>
             </a:r>
-            <a:r>
-              <a:rPr lang="en-US" baseline="0" dirty="0" smtClean="0">
-                <a:solidFill>
-                  <a:schemeClr val="tx1"/>
-                </a:solidFill>
-              </a:rPr>
-              <a:t>summoned to testify before U.S. Congress to share what he knew and when he knew it regarding this fraudulent </a:t>
-            </a:r>
-            <a:r>
-              <a:rPr lang="en-US" baseline="0" dirty="0" smtClean="0">
-                <a:solidFill>
-                  <a:schemeClr val="tx1"/>
-                </a:solidFill>
-              </a:rPr>
-              <a:t>activity.</a:t>
-            </a:r>
-            <a:endParaRPr lang="en-US" baseline="0" dirty="0" smtClean="0">
+          </a:p>
+          <a:p>
+            <a:endParaRPr lang="en-US" baseline="0" dirty="0">
               <a:solidFill>
                 <a:schemeClr val="tx1"/>
               </a:solidFill>
             </a:endParaRPr>
           </a:p>
           <a:p>
-            <a:endParaRPr lang="en-US" baseline="0" dirty="0" smtClean="0">
-              <a:solidFill>
-                <a:schemeClr val="tx1"/>
-              </a:solidFill>
-            </a:endParaRPr>
-          </a:p>
-          <a:p>
             <a:r>
-              <a:rPr lang="en-US" baseline="0" dirty="0" smtClean="0">
+              <a:rPr lang="en-US" baseline="0" dirty="0">
                 <a:solidFill>
                   <a:schemeClr val="tx1"/>
                 </a:solidFill>
@@ -8435,7 +8241,7 @@
               <a:t>How could a CEO be so unaware that </a:t>
             </a:r>
             <a:r>
-              <a:rPr lang="en-US" u="sng" baseline="0" dirty="0" smtClean="0">
+              <a:rPr lang="en-US" u="sng" baseline="0" dirty="0">
                 <a:solidFill>
                   <a:schemeClr val="tx1"/>
                 </a:solidFill>
@@ -8443,7 +8249,7 @@
               <a:t>5,300</a:t>
             </a:r>
             <a:r>
-              <a:rPr lang="en-US" baseline="0" dirty="0" smtClean="0">
+              <a:rPr lang="en-US" baseline="0" dirty="0">
                 <a:solidFill>
                   <a:schemeClr val="tx1"/>
                 </a:solidFill>
@@ -8452,7 +8258,7 @@
             </a:r>
           </a:p>
           <a:p>
-            <a:endParaRPr lang="en-US" baseline="0" dirty="0" smtClean="0">
+            <a:endParaRPr lang="en-US" baseline="0" dirty="0">
               <a:solidFill>
                 <a:schemeClr val="tx1"/>
               </a:solidFill>
@@ -8460,7 +8266,7 @@
           </a:p>
           <a:p>
             <a:r>
-              <a:rPr lang="en-US" baseline="0" dirty="0" smtClean="0">
+              <a:rPr lang="en-US" baseline="0" dirty="0">
                 <a:solidFill>
                   <a:schemeClr val="tx1"/>
                 </a:solidFill>
@@ -8468,7 +8274,7 @@
               <a:t>Low level managers would enforce unattainable sales quotas while simultaneously </a:t>
             </a:r>
             <a:r>
-              <a:rPr lang="en-US" sz="1200" b="0" i="0" kern="1200" dirty="0" smtClean="0">
+              <a:rPr lang="en-US" sz="1200" b="0" i="0" kern="1200" dirty="0">
                 <a:solidFill>
                   <a:schemeClr val="tx1"/>
                 </a:solidFill>
@@ -8481,7 +8287,7 @@
             </a:r>
           </a:p>
           <a:p>
-            <a:endParaRPr lang="en-US" sz="1200" b="0" i="0" kern="1200" dirty="0" smtClean="0">
+            <a:endParaRPr lang="en-US" sz="1200" b="0" i="0" kern="1200" dirty="0">
               <a:solidFill>
                 <a:schemeClr val="tx1"/>
               </a:solidFill>
@@ -8493,7 +8299,7 @@
           </a:p>
           <a:p>
             <a:r>
-              <a:rPr lang="en-US" sz="1200" b="0" i="0" kern="1200" dirty="0" smtClean="0">
+              <a:rPr lang="en-US" sz="1200" b="0" i="0" kern="1200" dirty="0">
                 <a:solidFill>
                   <a:schemeClr val="tx1"/>
                 </a:solidFill>
@@ -8505,7 +8311,7 @@
               <a:t>Customer</a:t>
             </a:r>
             <a:r>
-              <a:rPr lang="en-US" sz="1200" b="0" i="0" kern="1200" baseline="0" dirty="0" smtClean="0">
+              <a:rPr lang="en-US" sz="1200" b="0" i="0" kern="1200" baseline="0" dirty="0">
                 <a:solidFill>
                   <a:schemeClr val="tx1"/>
                 </a:solidFill>
@@ -8517,7 +8323,7 @@
               <a:t> complaints related to this fraudulent activity were clearly not being report up the chain of command.  </a:t>
             </a:r>
             <a:r>
-              <a:rPr lang="en-US" sz="1200" b="0" i="0" kern="1200" dirty="0" smtClean="0">
+              <a:rPr lang="en-US" sz="1200" b="0" i="0" kern="1200" dirty="0">
                 <a:solidFill>
                   <a:schemeClr val="tx1"/>
                 </a:solidFill>
@@ -8528,14 +8334,14 @@
               </a:rPr>
               <a:t>  </a:t>
             </a:r>
-            <a:endParaRPr lang="en-US" baseline="0" dirty="0" smtClean="0">
+            <a:endParaRPr lang="en-US" baseline="0" dirty="0">
               <a:solidFill>
                 <a:schemeClr val="tx1"/>
               </a:solidFill>
             </a:endParaRPr>
           </a:p>
           <a:p>
-            <a:endParaRPr lang="en-US" baseline="0" dirty="0" smtClean="0">
+            <a:endParaRPr lang="en-US" baseline="0" dirty="0">
               <a:solidFill>
                 <a:schemeClr val="tx1"/>
               </a:solidFill>
@@ -8543,7 +8349,7 @@
           </a:p>
           <a:p>
             <a:r>
-              <a:rPr lang="en-US" b="1" baseline="0" dirty="0" smtClean="0">
+              <a:rPr lang="en-US" b="1" baseline="0" dirty="0">
                 <a:solidFill>
                   <a:schemeClr val="tx1"/>
                 </a:solidFill>
@@ -8552,7 +8358,7 @@
             </a:r>
           </a:p>
           <a:p>
-            <a:endParaRPr lang="en-US" baseline="0" dirty="0" smtClean="0">
+            <a:endParaRPr lang="en-US" baseline="0" dirty="0">
               <a:solidFill>
                 <a:schemeClr val="tx1"/>
               </a:solidFill>
@@ -8560,7 +8366,7 @@
           </a:p>
           <a:p>
             <a:r>
-              <a:rPr lang="en-US" baseline="0" dirty="0" smtClean="0">
+              <a:rPr lang="en-US" baseline="0" dirty="0">
                 <a:solidFill>
                   <a:schemeClr val="tx1"/>
                 </a:solidFill>
@@ -8569,7 +8375,7 @@
             </a:r>
           </a:p>
           <a:p>
-            <a:endParaRPr lang="en-US" baseline="0" dirty="0" smtClean="0">
+            <a:endParaRPr lang="en-US" baseline="0" dirty="0">
               <a:solidFill>
                 <a:schemeClr val="tx1"/>
               </a:solidFill>
@@ -8577,7 +8383,7 @@
           </a:p>
           <a:p>
             <a:r>
-              <a:rPr lang="en-US" b="1" baseline="0" dirty="0" smtClean="0">
+              <a:rPr lang="en-US" b="1" baseline="0" dirty="0">
                 <a:solidFill>
                   <a:schemeClr val="tx1"/>
                 </a:solidFill>
@@ -8585,7 +8391,7 @@
               <a:t>*click* </a:t>
             </a:r>
             <a:r>
-              <a:rPr lang="en-US" baseline="0" dirty="0" smtClean="0">
+              <a:rPr lang="en-US" baseline="0" dirty="0">
                 <a:solidFill>
                   <a:schemeClr val="tx1"/>
                 </a:solidFill>
@@ -8594,7 +8400,7 @@
             </a:r>
           </a:p>
           <a:p>
-            <a:endParaRPr lang="en-US" baseline="0" dirty="0" smtClean="0"/>
+            <a:endParaRPr lang="en-US" baseline="0" dirty="0"/>
           </a:p>
           <a:p>
             <a:endParaRPr lang="en-US" dirty="0"/>
@@ -8681,45 +8487,45 @@
           <a:bodyPr/>
           <a:lstStyle/>
           <a:p>
-            <a:endParaRPr lang="en-US" dirty="0" smtClean="0"/>
+            <a:endParaRPr lang="en-US" dirty="0"/>
           </a:p>
           <a:p>
             <a:r>
-              <a:rPr lang="en-US" dirty="0" smtClean="0"/>
+              <a:rPr lang="en-US" dirty="0"/>
               <a:t>The model for</a:t>
             </a:r>
             <a:r>
-              <a:rPr lang="en-US" baseline="0" dirty="0" smtClean="0"/>
+              <a:rPr lang="en-US" baseline="0" dirty="0"/>
               <a:t> analyzing customer complaints </a:t>
             </a:r>
             <a:r>
-              <a:rPr lang="en-US" dirty="0" smtClean="0"/>
+              <a:rPr lang="en-US" dirty="0"/>
               <a:t>at Wells Fargo was clearly broken.</a:t>
             </a:r>
           </a:p>
           <a:p>
-            <a:endParaRPr lang="en-US" dirty="0" smtClean="0"/>
+            <a:endParaRPr lang="en-US" dirty="0"/>
           </a:p>
           <a:p>
             <a:r>
-              <a:rPr lang="en-US" dirty="0" smtClean="0"/>
+              <a:rPr lang="en-US" dirty="0"/>
               <a:t>Complaint data was not</a:t>
             </a:r>
             <a:r>
-              <a:rPr lang="en-US" baseline="0" dirty="0" smtClean="0"/>
+              <a:rPr lang="en-US" baseline="0" dirty="0"/>
               <a:t> making it to senior decision makers.</a:t>
             </a:r>
           </a:p>
           <a:p>
-            <a:endParaRPr lang="en-US" baseline="0" dirty="0" smtClean="0"/>
+            <a:endParaRPr lang="en-US" baseline="0" dirty="0"/>
           </a:p>
           <a:p>
             <a:r>
-              <a:rPr lang="en-US" baseline="0" dirty="0" smtClean="0"/>
+              <a:rPr lang="en-US" baseline="0" dirty="0"/>
               <a:t>C-level Executives are left with the impression that complaint metrics are in </a:t>
             </a:r>
             <a:r>
-              <a:rPr lang="en-US" baseline="0" smtClean="0"/>
+              <a:rPr lang="en-US" baseline="0"/>
               <a:t>normal range.</a:t>
             </a:r>
             <a:endParaRPr lang="en-US" dirty="0"/>
@@ -8807,25 +8613,25 @@
           <a:lstStyle/>
           <a:p>
             <a:r>
-              <a:rPr lang="en-US" dirty="0" smtClean="0"/>
+              <a:rPr lang="en-US" dirty="0"/>
               <a:t>Team</a:t>
             </a:r>
             <a:r>
-              <a:rPr lang="en-US" baseline="0" dirty="0" smtClean="0"/>
+              <a:rPr lang="en-US" baseline="0" dirty="0"/>
               <a:t> 14 can short-circuit the communication process and provide unfiltered complaint data directly to C-level Executives</a:t>
             </a:r>
           </a:p>
           <a:p>
-            <a:endParaRPr lang="en-US" baseline="0" dirty="0" smtClean="0"/>
+            <a:endParaRPr lang="en-US" baseline="0" dirty="0"/>
           </a:p>
           <a:p>
             <a:r>
-              <a:rPr lang="en-US" baseline="0" dirty="0" smtClean="0"/>
+              <a:rPr lang="en-US" baseline="0" dirty="0"/>
               <a:t>We can provide:</a:t>
             </a:r>
           </a:p>
           <a:p>
-            <a:endParaRPr lang="en-US" baseline="0" dirty="0" smtClean="0"/>
+            <a:endParaRPr lang="en-US" baseline="0" dirty="0"/>
           </a:p>
           <a:p>
             <a:pPr marL="171450" indent="-171450">
@@ -8833,12 +8639,12 @@
               <a:buChar char="•"/>
             </a:pPr>
             <a:r>
-              <a:rPr lang="en-US" baseline="0" dirty="0" smtClean="0"/>
+              <a:rPr lang="en-US" baseline="0" dirty="0"/>
               <a:t>Descriptive analytics to demonstrate how a company is performing</a:t>
             </a:r>
           </a:p>
           <a:p>
-            <a:endParaRPr lang="en-US" baseline="0" dirty="0" smtClean="0"/>
+            <a:endParaRPr lang="en-US" baseline="0" dirty="0"/>
           </a:p>
           <a:p>
             <a:pPr marL="171450" indent="-171450">
@@ -8846,12 +8652,12 @@
               <a:buChar char="•"/>
             </a:pPr>
             <a:r>
-              <a:rPr lang="en-US" dirty="0" smtClean="0"/>
+              <a:rPr lang="en-US" dirty="0"/>
               <a:t>Predictive analytics to forecast future performance</a:t>
             </a:r>
           </a:p>
           <a:p>
-            <a:endParaRPr lang="en-US" dirty="0" smtClean="0"/>
+            <a:endParaRPr lang="en-US" dirty="0"/>
           </a:p>
           <a:p>
             <a:pPr marL="171450" indent="-171450">
@@ -8859,16 +8665,12 @@
               <a:buChar char="•"/>
             </a:pPr>
             <a:r>
-              <a:rPr lang="en-US" dirty="0" smtClean="0"/>
+              <a:rPr lang="en-US" dirty="0"/>
               <a:t>Competitive</a:t>
             </a:r>
             <a:r>
-              <a:rPr lang="en-US" baseline="0" dirty="0" smtClean="0"/>
-              <a:t> Intelligence; how to you compare to your peers</a:t>
-            </a:r>
-            <a:r>
-              <a:rPr lang="en-US" baseline="0" dirty="0" smtClean="0"/>
-              <a:t>?</a:t>
+              <a:rPr lang="en-US" baseline="0" dirty="0"/>
+              <a:t> Intelligence; how to you compare to your peers?</a:t>
             </a:r>
           </a:p>
           <a:p>
@@ -8876,7 +8678,7 @@
               <a:buFont typeface="Arial" panose="020B0604020202020204" pitchFamily="34" charset="0"/>
               <a:buChar char="•"/>
             </a:pPr>
-            <a:endParaRPr lang="en-US" baseline="0" dirty="0" smtClean="0"/>
+            <a:endParaRPr lang="en-US" baseline="0" dirty="0"/>
           </a:p>
           <a:p>
             <a:pPr marL="171450" indent="-171450">
@@ -8884,10 +8686,9 @@
               <a:buChar char="•"/>
             </a:pPr>
             <a:r>
-              <a:rPr lang="en-US" baseline="0" dirty="0" smtClean="0"/>
+              <a:rPr lang="en-US" baseline="0" dirty="0"/>
               <a:t>Enhanced datasets to identify potential Predatory Lending Practices.</a:t>
             </a:r>
-            <a:endParaRPr lang="en-US" baseline="0" dirty="0" smtClean="0"/>
           </a:p>
           <a:p>
             <a:endParaRPr lang="en-US" dirty="0"/>
@@ -8972,10 +8773,9 @@
           </a:lstStyle>
           <a:p>
             <a:r>
-              <a:rPr lang="en-US" smtClean="0"/>
+              <a:rPr lang="en-US"/>
               <a:t>Click to edit Master title style</a:t>
             </a:r>
-            <a:endParaRPr lang="en-US"/>
           </a:p>
         </p:txBody>
       </p:sp>
@@ -9037,10 +8837,9 @@
           </a:lstStyle>
           <a:p>
             <a:r>
-              <a:rPr lang="en-US" smtClean="0"/>
+              <a:rPr lang="en-US"/>
               <a:t>Click to edit Master subtitle style</a:t>
             </a:r>
-            <a:endParaRPr lang="en-US"/>
           </a:p>
         </p:txBody>
       </p:sp>
@@ -9061,7 +8860,7 @@
           <a:p>
             <a:fld id="{DC25F73F-9809-4F59-8EEB-8DFB3E802B1A}" type="datetimeFigureOut">
               <a:rPr lang="en-US" smtClean="0"/>
-              <a:t>12/1/2017</a:t>
+              <a:t>12/6/2017</a:t>
             </a:fld>
             <a:endParaRPr lang="en-US"/>
           </a:p>
@@ -9155,10 +8954,9 @@
           <a:lstStyle/>
           <a:p>
             <a:r>
-              <a:rPr lang="en-US" smtClean="0"/>
+              <a:rPr lang="en-US"/>
               <a:t>Click to edit Master title style</a:t>
             </a:r>
-            <a:endParaRPr lang="en-US"/>
           </a:p>
         </p:txBody>
       </p:sp>
@@ -9179,38 +8977,37 @@
           <a:p>
             <a:pPr lvl="0"/>
             <a:r>
-              <a:rPr lang="en-US" smtClean="0"/>
+              <a:rPr lang="en-US"/>
               <a:t>Edit Master text styles</a:t>
             </a:r>
           </a:p>
           <a:p>
             <a:pPr lvl="1"/>
             <a:r>
-              <a:rPr lang="en-US" smtClean="0"/>
+              <a:rPr lang="en-US"/>
               <a:t>Second level</a:t>
             </a:r>
           </a:p>
           <a:p>
             <a:pPr lvl="2"/>
             <a:r>
-              <a:rPr lang="en-US" smtClean="0"/>
+              <a:rPr lang="en-US"/>
               <a:t>Third level</a:t>
             </a:r>
           </a:p>
           <a:p>
             <a:pPr lvl="3"/>
             <a:r>
-              <a:rPr lang="en-US" smtClean="0"/>
+              <a:rPr lang="en-US"/>
               <a:t>Fourth level</a:t>
             </a:r>
           </a:p>
           <a:p>
             <a:pPr lvl="4"/>
             <a:r>
-              <a:rPr lang="en-US" smtClean="0"/>
+              <a:rPr lang="en-US"/>
               <a:t>Fifth level</a:t>
             </a:r>
-            <a:endParaRPr lang="en-US"/>
           </a:p>
         </p:txBody>
       </p:sp>
@@ -9231,7 +9028,7 @@
           <a:p>
             <a:fld id="{DC25F73F-9809-4F59-8EEB-8DFB3E802B1A}" type="datetimeFigureOut">
               <a:rPr lang="en-US" smtClean="0"/>
-              <a:t>12/1/2017</a:t>
+              <a:t>12/6/2017</a:t>
             </a:fld>
             <a:endParaRPr lang="en-US"/>
           </a:p>
@@ -9330,10 +9127,9 @@
           <a:lstStyle/>
           <a:p>
             <a:r>
-              <a:rPr lang="en-US" smtClean="0"/>
+              <a:rPr lang="en-US"/>
               <a:t>Click to edit Master title style</a:t>
             </a:r>
-            <a:endParaRPr lang="en-US"/>
           </a:p>
         </p:txBody>
       </p:sp>
@@ -9359,38 +9155,37 @@
           <a:p>
             <a:pPr lvl="0"/>
             <a:r>
-              <a:rPr lang="en-US" smtClean="0"/>
+              <a:rPr lang="en-US"/>
               <a:t>Edit Master text styles</a:t>
             </a:r>
           </a:p>
           <a:p>
             <a:pPr lvl="1"/>
             <a:r>
-              <a:rPr lang="en-US" smtClean="0"/>
+              <a:rPr lang="en-US"/>
               <a:t>Second level</a:t>
             </a:r>
           </a:p>
           <a:p>
             <a:pPr lvl="2"/>
             <a:r>
-              <a:rPr lang="en-US" smtClean="0"/>
+              <a:rPr lang="en-US"/>
               <a:t>Third level</a:t>
             </a:r>
           </a:p>
           <a:p>
             <a:pPr lvl="3"/>
             <a:r>
-              <a:rPr lang="en-US" smtClean="0"/>
+              <a:rPr lang="en-US"/>
               <a:t>Fourth level</a:t>
             </a:r>
           </a:p>
           <a:p>
             <a:pPr lvl="4"/>
             <a:r>
-              <a:rPr lang="en-US" smtClean="0"/>
+              <a:rPr lang="en-US"/>
               <a:t>Fifth level</a:t>
             </a:r>
-            <a:endParaRPr lang="en-US"/>
           </a:p>
         </p:txBody>
       </p:sp>
@@ -9411,7 +9206,7 @@
           <a:p>
             <a:fld id="{DC25F73F-9809-4F59-8EEB-8DFB3E802B1A}" type="datetimeFigureOut">
               <a:rPr lang="en-US" smtClean="0"/>
-              <a:t>12/1/2017</a:t>
+              <a:t>12/6/2017</a:t>
             </a:fld>
             <a:endParaRPr lang="en-US"/>
           </a:p>
@@ -9505,10 +9300,9 @@
           <a:lstStyle/>
           <a:p>
             <a:r>
-              <a:rPr lang="en-US" smtClean="0"/>
+              <a:rPr lang="en-US"/>
               <a:t>Click to edit Master title style</a:t>
             </a:r>
-            <a:endParaRPr lang="en-US"/>
           </a:p>
         </p:txBody>
       </p:sp>
@@ -9529,38 +9323,37 @@
           <a:p>
             <a:pPr lvl="0"/>
             <a:r>
-              <a:rPr lang="en-US" smtClean="0"/>
+              <a:rPr lang="en-US"/>
               <a:t>Edit Master text styles</a:t>
             </a:r>
           </a:p>
           <a:p>
             <a:pPr lvl="1"/>
             <a:r>
-              <a:rPr lang="en-US" smtClean="0"/>
+              <a:rPr lang="en-US"/>
               <a:t>Second level</a:t>
             </a:r>
           </a:p>
           <a:p>
             <a:pPr lvl="2"/>
             <a:r>
-              <a:rPr lang="en-US" smtClean="0"/>
+              <a:rPr lang="en-US"/>
               <a:t>Third level</a:t>
             </a:r>
           </a:p>
           <a:p>
             <a:pPr lvl="3"/>
             <a:r>
-              <a:rPr lang="en-US" smtClean="0"/>
+              <a:rPr lang="en-US"/>
               <a:t>Fourth level</a:t>
             </a:r>
           </a:p>
           <a:p>
             <a:pPr lvl="4"/>
             <a:r>
-              <a:rPr lang="en-US" smtClean="0"/>
+              <a:rPr lang="en-US"/>
               <a:t>Fifth level</a:t>
             </a:r>
-            <a:endParaRPr lang="en-US"/>
           </a:p>
         </p:txBody>
       </p:sp>
@@ -9581,7 +9374,7 @@
           <a:p>
             <a:fld id="{DC25F73F-9809-4F59-8EEB-8DFB3E802B1A}" type="datetimeFigureOut">
               <a:rPr lang="en-US" smtClean="0"/>
-              <a:t>12/1/2017</a:t>
+              <a:t>12/6/2017</a:t>
             </a:fld>
             <a:endParaRPr lang="en-US"/>
           </a:p>
@@ -9684,10 +9477,9 @@
           </a:lstStyle>
           <a:p>
             <a:r>
-              <a:rPr lang="en-US" smtClean="0"/>
+              <a:rPr lang="en-US"/>
               <a:t>Click to edit Master title style</a:t>
             </a:r>
-            <a:endParaRPr lang="en-US"/>
           </a:p>
         </p:txBody>
       </p:sp>
@@ -9804,7 +9596,7 @@
           <a:p>
             <a:pPr lvl="0"/>
             <a:r>
-              <a:rPr lang="en-US" smtClean="0"/>
+              <a:rPr lang="en-US"/>
               <a:t>Edit Master text styles</a:t>
             </a:r>
           </a:p>
@@ -9827,7 +9619,7 @@
           <a:p>
             <a:fld id="{DC25F73F-9809-4F59-8EEB-8DFB3E802B1A}" type="datetimeFigureOut">
               <a:rPr lang="en-US" smtClean="0"/>
-              <a:t>12/1/2017</a:t>
+              <a:t>12/6/2017</a:t>
             </a:fld>
             <a:endParaRPr lang="en-US"/>
           </a:p>
@@ -9921,10 +9713,9 @@
           <a:lstStyle/>
           <a:p>
             <a:r>
-              <a:rPr lang="en-US" smtClean="0"/>
+              <a:rPr lang="en-US"/>
               <a:t>Click to edit Master title style</a:t>
             </a:r>
-            <a:endParaRPr lang="en-US"/>
           </a:p>
         </p:txBody>
       </p:sp>
@@ -9950,38 +9741,37 @@
           <a:p>
             <a:pPr lvl="0"/>
             <a:r>
-              <a:rPr lang="en-US" smtClean="0"/>
+              <a:rPr lang="en-US"/>
               <a:t>Edit Master text styles</a:t>
             </a:r>
           </a:p>
           <a:p>
             <a:pPr lvl="1"/>
             <a:r>
-              <a:rPr lang="en-US" smtClean="0"/>
+              <a:rPr lang="en-US"/>
               <a:t>Second level</a:t>
             </a:r>
           </a:p>
           <a:p>
             <a:pPr lvl="2"/>
             <a:r>
-              <a:rPr lang="en-US" smtClean="0"/>
+              <a:rPr lang="en-US"/>
               <a:t>Third level</a:t>
             </a:r>
           </a:p>
           <a:p>
             <a:pPr lvl="3"/>
             <a:r>
-              <a:rPr lang="en-US" smtClean="0"/>
+              <a:rPr lang="en-US"/>
               <a:t>Fourth level</a:t>
             </a:r>
           </a:p>
           <a:p>
             <a:pPr lvl="4"/>
             <a:r>
-              <a:rPr lang="en-US" smtClean="0"/>
+              <a:rPr lang="en-US"/>
               <a:t>Fifth level</a:t>
             </a:r>
-            <a:endParaRPr lang="en-US"/>
           </a:p>
         </p:txBody>
       </p:sp>
@@ -10007,38 +9797,37 @@
           <a:p>
             <a:pPr lvl="0"/>
             <a:r>
-              <a:rPr lang="en-US" smtClean="0"/>
+              <a:rPr lang="en-US"/>
               <a:t>Edit Master text styles</a:t>
             </a:r>
           </a:p>
           <a:p>
             <a:pPr lvl="1"/>
             <a:r>
-              <a:rPr lang="en-US" smtClean="0"/>
+              <a:rPr lang="en-US"/>
               <a:t>Second level</a:t>
             </a:r>
           </a:p>
           <a:p>
             <a:pPr lvl="2"/>
             <a:r>
-              <a:rPr lang="en-US" smtClean="0"/>
+              <a:rPr lang="en-US"/>
               <a:t>Third level</a:t>
             </a:r>
           </a:p>
           <a:p>
             <a:pPr lvl="3"/>
             <a:r>
-              <a:rPr lang="en-US" smtClean="0"/>
+              <a:rPr lang="en-US"/>
               <a:t>Fourth level</a:t>
             </a:r>
           </a:p>
           <a:p>
             <a:pPr lvl="4"/>
             <a:r>
-              <a:rPr lang="en-US" smtClean="0"/>
+              <a:rPr lang="en-US"/>
               <a:t>Fifth level</a:t>
             </a:r>
-            <a:endParaRPr lang="en-US"/>
           </a:p>
         </p:txBody>
       </p:sp>
@@ -10059,7 +9848,7 @@
           <a:p>
             <a:fld id="{DC25F73F-9809-4F59-8EEB-8DFB3E802B1A}" type="datetimeFigureOut">
               <a:rPr lang="en-US" smtClean="0"/>
-              <a:t>12/1/2017</a:t>
+              <a:t>12/6/2017</a:t>
             </a:fld>
             <a:endParaRPr lang="en-US"/>
           </a:p>
@@ -10158,10 +9947,9 @@
           <a:lstStyle/>
           <a:p>
             <a:r>
-              <a:rPr lang="en-US" smtClean="0"/>
+              <a:rPr lang="en-US"/>
               <a:t>Click to edit Master title style</a:t>
             </a:r>
-            <a:endParaRPr lang="en-US"/>
           </a:p>
         </p:txBody>
       </p:sp>
@@ -10224,7 +10012,7 @@
           <a:p>
             <a:pPr lvl="0"/>
             <a:r>
-              <a:rPr lang="en-US" smtClean="0"/>
+              <a:rPr lang="en-US"/>
               <a:t>Edit Master text styles</a:t>
             </a:r>
           </a:p>
@@ -10252,38 +10040,37 @@
           <a:p>
             <a:pPr lvl="0"/>
             <a:r>
-              <a:rPr lang="en-US" smtClean="0"/>
+              <a:rPr lang="en-US"/>
               <a:t>Edit Master text styles</a:t>
             </a:r>
           </a:p>
           <a:p>
             <a:pPr lvl="1"/>
             <a:r>
-              <a:rPr lang="en-US" smtClean="0"/>
+              <a:rPr lang="en-US"/>
               <a:t>Second level</a:t>
             </a:r>
           </a:p>
           <a:p>
             <a:pPr lvl="2"/>
             <a:r>
-              <a:rPr lang="en-US" smtClean="0"/>
+              <a:rPr lang="en-US"/>
               <a:t>Third level</a:t>
             </a:r>
           </a:p>
           <a:p>
             <a:pPr lvl="3"/>
             <a:r>
-              <a:rPr lang="en-US" smtClean="0"/>
+              <a:rPr lang="en-US"/>
               <a:t>Fourth level</a:t>
             </a:r>
           </a:p>
           <a:p>
             <a:pPr lvl="4"/>
             <a:r>
-              <a:rPr lang="en-US" smtClean="0"/>
+              <a:rPr lang="en-US"/>
               <a:t>Fifth level</a:t>
             </a:r>
-            <a:endParaRPr lang="en-US"/>
           </a:p>
         </p:txBody>
       </p:sp>
@@ -10346,7 +10133,7 @@
           <a:p>
             <a:pPr lvl="0"/>
             <a:r>
-              <a:rPr lang="en-US" smtClean="0"/>
+              <a:rPr lang="en-US"/>
               <a:t>Edit Master text styles</a:t>
             </a:r>
           </a:p>
@@ -10374,38 +10161,37 @@
           <a:p>
             <a:pPr lvl="0"/>
             <a:r>
-              <a:rPr lang="en-US" smtClean="0"/>
+              <a:rPr lang="en-US"/>
               <a:t>Edit Master text styles</a:t>
             </a:r>
           </a:p>
           <a:p>
             <a:pPr lvl="1"/>
             <a:r>
-              <a:rPr lang="en-US" smtClean="0"/>
+              <a:rPr lang="en-US"/>
               <a:t>Second level</a:t>
             </a:r>
           </a:p>
           <a:p>
             <a:pPr lvl="2"/>
             <a:r>
-              <a:rPr lang="en-US" smtClean="0"/>
+              <a:rPr lang="en-US"/>
               <a:t>Third level</a:t>
             </a:r>
           </a:p>
           <a:p>
             <a:pPr lvl="3"/>
             <a:r>
-              <a:rPr lang="en-US" smtClean="0"/>
+              <a:rPr lang="en-US"/>
               <a:t>Fourth level</a:t>
             </a:r>
           </a:p>
           <a:p>
             <a:pPr lvl="4"/>
             <a:r>
-              <a:rPr lang="en-US" smtClean="0"/>
+              <a:rPr lang="en-US"/>
               <a:t>Fifth level</a:t>
             </a:r>
-            <a:endParaRPr lang="en-US"/>
           </a:p>
         </p:txBody>
       </p:sp>
@@ -10426,7 +10212,7 @@
           <a:p>
             <a:fld id="{DC25F73F-9809-4F59-8EEB-8DFB3E802B1A}" type="datetimeFigureOut">
               <a:rPr lang="en-US" smtClean="0"/>
-              <a:t>12/1/2017</a:t>
+              <a:t>12/6/2017</a:t>
             </a:fld>
             <a:endParaRPr lang="en-US"/>
           </a:p>
@@ -10520,10 +10306,9 @@
           <a:lstStyle/>
           <a:p>
             <a:r>
-              <a:rPr lang="en-US" smtClean="0"/>
+              <a:rPr lang="en-US"/>
               <a:t>Click to edit Master title style</a:t>
             </a:r>
-            <a:endParaRPr lang="en-US"/>
           </a:p>
         </p:txBody>
       </p:sp>
@@ -10544,7 +10329,7 @@
           <a:p>
             <a:fld id="{DC25F73F-9809-4F59-8EEB-8DFB3E802B1A}" type="datetimeFigureOut">
               <a:rPr lang="en-US" smtClean="0"/>
-              <a:t>12/1/2017</a:t>
+              <a:t>12/6/2017</a:t>
             </a:fld>
             <a:endParaRPr lang="en-US"/>
           </a:p>
@@ -10639,7 +10424,7 @@
           <a:p>
             <a:fld id="{DC25F73F-9809-4F59-8EEB-8DFB3E802B1A}" type="datetimeFigureOut">
               <a:rPr lang="en-US" smtClean="0"/>
-              <a:t>12/1/2017</a:t>
+              <a:t>12/6/2017</a:t>
             </a:fld>
             <a:endParaRPr lang="en-US"/>
           </a:p>
@@ -10742,10 +10527,9 @@
           </a:lstStyle>
           <a:p>
             <a:r>
-              <a:rPr lang="en-US" smtClean="0"/>
+              <a:rPr lang="en-US"/>
               <a:t>Click to edit Master title style</a:t>
             </a:r>
-            <a:endParaRPr lang="en-US"/>
           </a:p>
         </p:txBody>
       </p:sp>
@@ -10799,38 +10583,37 @@
           <a:p>
             <a:pPr lvl="0"/>
             <a:r>
-              <a:rPr lang="en-US" smtClean="0"/>
+              <a:rPr lang="en-US"/>
               <a:t>Edit Master text styles</a:t>
             </a:r>
           </a:p>
           <a:p>
             <a:pPr lvl="1"/>
             <a:r>
-              <a:rPr lang="en-US" smtClean="0"/>
+              <a:rPr lang="en-US"/>
               <a:t>Second level</a:t>
             </a:r>
           </a:p>
           <a:p>
             <a:pPr lvl="2"/>
             <a:r>
-              <a:rPr lang="en-US" smtClean="0"/>
+              <a:rPr lang="en-US"/>
               <a:t>Third level</a:t>
             </a:r>
           </a:p>
           <a:p>
             <a:pPr lvl="3"/>
             <a:r>
-              <a:rPr lang="en-US" smtClean="0"/>
+              <a:rPr lang="en-US"/>
               <a:t>Fourth level</a:t>
             </a:r>
           </a:p>
           <a:p>
             <a:pPr lvl="4"/>
             <a:r>
-              <a:rPr lang="en-US" smtClean="0"/>
+              <a:rPr lang="en-US"/>
               <a:t>Fifth level</a:t>
             </a:r>
-            <a:endParaRPr lang="en-US"/>
           </a:p>
         </p:txBody>
       </p:sp>
@@ -10893,7 +10676,7 @@
           <a:p>
             <a:pPr lvl="0"/>
             <a:r>
-              <a:rPr lang="en-US" smtClean="0"/>
+              <a:rPr lang="en-US"/>
               <a:t>Edit Master text styles</a:t>
             </a:r>
           </a:p>
@@ -10916,7 +10699,7 @@
           <a:p>
             <a:fld id="{DC25F73F-9809-4F59-8EEB-8DFB3E802B1A}" type="datetimeFigureOut">
               <a:rPr lang="en-US" smtClean="0"/>
-              <a:t>12/1/2017</a:t>
+              <a:t>12/6/2017</a:t>
             </a:fld>
             <a:endParaRPr lang="en-US"/>
           </a:p>
@@ -11019,10 +10802,9 @@
           </a:lstStyle>
           <a:p>
             <a:r>
-              <a:rPr lang="en-US" smtClean="0"/>
+              <a:rPr lang="en-US"/>
               <a:t>Click to edit Master title style</a:t>
             </a:r>
-            <a:endParaRPr lang="en-US"/>
           </a:p>
         </p:txBody>
       </p:sp>
@@ -11146,7 +10928,7 @@
           <a:p>
             <a:pPr lvl="0"/>
             <a:r>
-              <a:rPr lang="en-US" smtClean="0"/>
+              <a:rPr lang="en-US"/>
               <a:t>Edit Master text styles</a:t>
             </a:r>
           </a:p>
@@ -11169,7 +10951,7 @@
           <a:p>
             <a:fld id="{DC25F73F-9809-4F59-8EEB-8DFB3E802B1A}" type="datetimeFigureOut">
               <a:rPr lang="en-US" smtClean="0"/>
-              <a:t>12/1/2017</a:t>
+              <a:t>12/6/2017</a:t>
             </a:fld>
             <a:endParaRPr lang="en-US"/>
           </a:p>
@@ -11278,10 +11060,9 @@
           <a:lstStyle/>
           <a:p>
             <a:r>
-              <a:rPr lang="en-US" smtClean="0"/>
+              <a:rPr lang="en-US"/>
               <a:t>Click to edit Master title style</a:t>
             </a:r>
-            <a:endParaRPr lang="en-US"/>
           </a:p>
         </p:txBody>
       </p:sp>
@@ -11312,38 +11093,37 @@
           <a:p>
             <a:pPr lvl="0"/>
             <a:r>
-              <a:rPr lang="en-US" smtClean="0"/>
+              <a:rPr lang="en-US"/>
               <a:t>Edit Master text styles</a:t>
             </a:r>
           </a:p>
           <a:p>
             <a:pPr lvl="1"/>
             <a:r>
-              <a:rPr lang="en-US" smtClean="0"/>
+              <a:rPr lang="en-US"/>
               <a:t>Second level</a:t>
             </a:r>
           </a:p>
           <a:p>
             <a:pPr lvl="2"/>
             <a:r>
-              <a:rPr lang="en-US" smtClean="0"/>
+              <a:rPr lang="en-US"/>
               <a:t>Third level</a:t>
             </a:r>
           </a:p>
           <a:p>
             <a:pPr lvl="3"/>
             <a:r>
-              <a:rPr lang="en-US" smtClean="0"/>
+              <a:rPr lang="en-US"/>
               <a:t>Fourth level</a:t>
             </a:r>
           </a:p>
           <a:p>
             <a:pPr lvl="4"/>
             <a:r>
-              <a:rPr lang="en-US" smtClean="0"/>
+              <a:rPr lang="en-US"/>
               <a:t>Fifth level</a:t>
             </a:r>
-            <a:endParaRPr lang="en-US"/>
           </a:p>
         </p:txBody>
       </p:sp>
@@ -11382,7 +11162,7 @@
           <a:p>
             <a:fld id="{DC25F73F-9809-4F59-8EEB-8DFB3E802B1A}" type="datetimeFigureOut">
               <a:rPr lang="en-US" smtClean="0"/>
-              <a:t>12/1/2017</a:t>
+              <a:t>12/6/2017</a:t>
             </a:fld>
             <a:endParaRPr lang="en-US"/>
           </a:p>
@@ -11835,7 +11615,7 @@
           <a:p>
             <a:pPr algn="ctr"/>
             <a:r>
-              <a:rPr lang="en-US" b="1" i="1" dirty="0" smtClean="0">
+              <a:rPr lang="en-US" b="1" i="1" dirty="0">
                 <a:effectLst/>
               </a:rPr>
               <a:t>Wells Fargo's September from hell</a:t>
@@ -11843,15 +11623,15 @@
           </a:p>
           <a:p>
             <a:pPr algn="ctr"/>
-            <a:endParaRPr lang="en-US" sz="1050" b="1" dirty="0" smtClean="0"/>
+            <a:endParaRPr lang="en-US" sz="1050" b="1" dirty="0"/>
           </a:p>
           <a:p>
             <a:pPr algn="ctr"/>
             <a:r>
-              <a:rPr lang="en-US" sz="1050" b="1" dirty="0" smtClean="0"/>
+              <a:rPr lang="en-US" sz="1050" b="1" dirty="0"/>
               <a:t>-CNN</a:t>
             </a:r>
-            <a:endParaRPr lang="en-US" sz="1050" b="1" dirty="0" smtClean="0">
+            <a:endParaRPr lang="en-US" sz="1050" b="1" dirty="0">
               <a:effectLst/>
             </a:endParaRPr>
           </a:p>
@@ -11881,7 +11661,7 @@
           <a:p>
             <a:pPr algn="ctr"/>
             <a:r>
-              <a:rPr lang="en-US" b="1" i="1" dirty="0" smtClean="0">
+              <a:rPr lang="en-US" b="1" i="1" dirty="0">
                 <a:effectLst/>
               </a:rPr>
               <a:t>Elizabeth Warren to Wells Fargo CEO: 'You should be fired‘</a:t>
@@ -11889,15 +11669,14 @@
           </a:p>
           <a:p>
             <a:pPr algn="ctr"/>
-            <a:endParaRPr lang="en-US" sz="1000" dirty="0" smtClean="0"/>
+            <a:endParaRPr lang="en-US" sz="1000" dirty="0"/>
           </a:p>
           <a:p>
             <a:pPr algn="ctr"/>
             <a:r>
-              <a:rPr lang="en-US" sz="1000" b="1" dirty="0" smtClean="0"/>
+              <a:rPr lang="en-US" sz="1000" b="1" dirty="0"/>
               <a:t>-CNN</a:t>
             </a:r>
-            <a:endParaRPr lang="en-US" sz="1000" b="1" dirty="0"/>
           </a:p>
         </p:txBody>
       </p:sp>
@@ -11925,26 +11704,26 @@
           <a:p>
             <a:pPr algn="ctr"/>
             <a:r>
-              <a:rPr lang="en-US" b="1" i="1" dirty="0" smtClean="0"/>
+              <a:rPr lang="en-US" b="1" i="1" dirty="0"/>
               <a:t>Wells Fargo CEO John </a:t>
             </a:r>
             <a:r>
-              <a:rPr lang="en-US" b="1" i="1" dirty="0" err="1" smtClean="0"/>
+              <a:rPr lang="en-US" b="1" i="1" dirty="0" err="1"/>
               <a:t>Stumpf</a:t>
             </a:r>
             <a:r>
-              <a:rPr lang="en-US" b="1" i="1" dirty="0" smtClean="0"/>
+              <a:rPr lang="en-US" b="1" i="1" dirty="0"/>
               <a:t> GRILLED by Congress - House Financial Services Committee Hearing </a:t>
             </a:r>
           </a:p>
           <a:p>
             <a:pPr algn="ctr"/>
-            <a:endParaRPr lang="en-US" sz="1000" b="1" dirty="0" smtClean="0"/>
+            <a:endParaRPr lang="en-US" sz="1000" b="1" dirty="0"/>
           </a:p>
           <a:p>
             <a:pPr algn="ctr"/>
             <a:r>
-              <a:rPr lang="en-US" sz="1000" b="1" dirty="0" smtClean="0"/>
+              <a:rPr lang="en-US" sz="1000" b="1" dirty="0"/>
               <a:t>-Fox News</a:t>
             </a:r>
             <a:endParaRPr lang="en-US" sz="1000" dirty="0"/>
@@ -12022,7 +11801,7 @@
           <a:p>
             <a:pPr algn="ctr"/>
             <a:r>
-              <a:rPr lang="en-US" sz="5400" b="1" dirty="0" smtClean="0">
+              <a:rPr lang="en-US" sz="5400" b="1" dirty="0">
                 <a:ln w="22225">
                   <a:solidFill>
                     <a:schemeClr val="tx1"/>
@@ -12039,7 +11818,7 @@
           <a:p>
             <a:pPr algn="ctr"/>
             <a:r>
-              <a:rPr lang="en-US" sz="5400" b="1" dirty="0" smtClean="0">
+              <a:rPr lang="en-US" sz="5400" b="1" dirty="0">
                 <a:ln w="22225">
                   <a:solidFill>
                     <a:schemeClr val="tx1"/>
@@ -12052,17 +11831,6 @@
               </a:rPr>
               <a:t>Don’t be like John</a:t>
             </a:r>
-            <a:endParaRPr lang="en-US" sz="5400" b="1" dirty="0">
-              <a:ln w="22225">
-                <a:solidFill>
-                  <a:schemeClr val="tx1"/>
-                </a:solidFill>
-                <a:prstDash val="solid"/>
-              </a:ln>
-              <a:solidFill>
-                <a:srgbClr val="FF0000"/>
-              </a:solidFill>
-            </a:endParaRPr>
           </a:p>
         </p:txBody>
       </p:sp>
@@ -12488,10 +12256,9 @@
           <a:p>
             <a:pPr algn="ctr"/>
             <a:r>
-              <a:rPr lang="en-US" sz="1400" dirty="0" smtClean="0"/>
+              <a:rPr lang="en-US" sz="1400" dirty="0"/>
               <a:t>COMPLAINTS</a:t>
             </a:r>
-            <a:endParaRPr lang="en-US" sz="1400" dirty="0"/>
           </a:p>
         </p:txBody>
       </p:sp>
@@ -12535,10 +12302,9 @@
           <a:p>
             <a:pPr algn="ctr"/>
             <a:r>
-              <a:rPr lang="en-US" dirty="0" smtClean="0"/>
+              <a:rPr lang="en-US" dirty="0"/>
               <a:t>STOP</a:t>
             </a:r>
-            <a:endParaRPr lang="en-US" dirty="0"/>
           </a:p>
         </p:txBody>
       </p:sp>
@@ -12565,12 +12331,12 @@
           <a:lstStyle/>
           <a:p>
             <a:r>
-              <a:rPr lang="en-US" b="1" dirty="0" smtClean="0"/>
+              <a:rPr lang="en-US" b="1" dirty="0"/>
               <a:t>Broken model:</a:t>
             </a:r>
           </a:p>
           <a:p>
-            <a:endParaRPr lang="en-US" dirty="0" smtClean="0"/>
+            <a:endParaRPr lang="en-US" dirty="0"/>
           </a:p>
           <a:p>
             <a:pPr marL="285750" indent="-285750">
@@ -12578,7 +12344,7 @@
               <a:buChar char="•"/>
             </a:pPr>
             <a:r>
-              <a:rPr lang="en-US" dirty="0" smtClean="0"/>
+              <a:rPr lang="en-US" dirty="0"/>
               <a:t>Complaint data stopped at lower levels of management</a:t>
             </a:r>
           </a:p>
@@ -12587,7 +12353,7 @@
               <a:buFont typeface="Arial" panose="020B0604020202020204" pitchFamily="34" charset="0"/>
               <a:buChar char="•"/>
             </a:pPr>
-            <a:endParaRPr lang="en-US" dirty="0" smtClean="0"/>
+            <a:endParaRPr lang="en-US" dirty="0"/>
           </a:p>
           <a:p>
             <a:pPr marL="285750" indent="-285750">
@@ -12595,7 +12361,7 @@
               <a:buChar char="•"/>
             </a:pPr>
             <a:r>
-              <a:rPr lang="en-US" dirty="0" smtClean="0"/>
+              <a:rPr lang="en-US" dirty="0"/>
               <a:t>C-level Executives “flying blind”</a:t>
             </a:r>
           </a:p>
@@ -12645,10 +12411,9 @@
           <a:p>
             <a:pPr algn="ctr"/>
             <a:r>
-              <a:rPr lang="en-US" sz="1600" dirty="0" smtClean="0"/>
+              <a:rPr lang="en-US" sz="1600" dirty="0"/>
               <a:t>COMPLAINTS IN NORMAL RANGE</a:t>
             </a:r>
-            <a:endParaRPr lang="en-US" sz="1600" dirty="0"/>
           </a:p>
         </p:txBody>
       </p:sp>
@@ -12662,13 +12427,6 @@
   <p:clrMapOvr>
     <a:masterClrMapping/>
   </p:clrMapOvr>
-  <p:timing>
-    <p:tnLst>
-      <p:par>
-        <p:cTn id="1" dur="indefinite" restart="never" nodeType="tmRoot"/>
-      </p:par>
-    </p:tnLst>
-  </p:timing>
 </p:sld>
 </file>
 
@@ -12755,10 +12513,9 @@
           <a:p>
             <a:pPr algn="ctr"/>
             <a:r>
-              <a:rPr lang="en-US" sz="1400" dirty="0" smtClean="0"/>
+              <a:rPr lang="en-US" sz="1400" dirty="0"/>
               <a:t>COMPLAINTS</a:t>
             </a:r>
-            <a:endParaRPr lang="en-US" sz="1400" dirty="0"/>
           </a:p>
         </p:txBody>
       </p:sp>
@@ -12771,7 +12528,7 @@
         <p:spPr>
           <a:xfrm>
             <a:off x="300791" y="264695"/>
-            <a:ext cx="3645567" cy="4893647"/>
+            <a:ext cx="3645567" cy="4339650"/>
           </a:xfrm>
           <a:prstGeom prst="rect">
             <a:avLst/>
@@ -12785,12 +12542,12 @@
           <a:lstStyle/>
           <a:p>
             <a:r>
-              <a:rPr lang="en-US" b="1" dirty="0" smtClean="0"/>
+              <a:rPr lang="en-US" b="1" dirty="0"/>
               <a:t>TEAM 14’s value proposition:</a:t>
             </a:r>
           </a:p>
           <a:p>
-            <a:endParaRPr lang="en-US" dirty="0" smtClean="0"/>
+            <a:endParaRPr lang="en-US" dirty="0"/>
           </a:p>
           <a:p>
             <a:pPr marL="285750" indent="-285750">
@@ -12798,16 +12555,16 @@
               <a:buChar char="•"/>
             </a:pPr>
             <a:r>
-              <a:rPr lang="en-US" u="sng" dirty="0" smtClean="0"/>
+              <a:rPr lang="en-US" u="sng" dirty="0"/>
               <a:t>Descriptive</a:t>
             </a:r>
             <a:r>
-              <a:rPr lang="en-US" dirty="0" smtClean="0"/>
+              <a:rPr lang="en-US" dirty="0"/>
               <a:t> Analytics</a:t>
             </a:r>
           </a:p>
           <a:p>
-            <a:endParaRPr lang="en-US" dirty="0" smtClean="0"/>
+            <a:endParaRPr lang="en-US" dirty="0"/>
           </a:p>
           <a:p>
             <a:pPr marL="285750" indent="-285750">
@@ -12815,16 +12572,12 @@
               <a:buChar char="•"/>
             </a:pPr>
             <a:r>
-              <a:rPr lang="en-US" u="sng" dirty="0" smtClean="0"/>
-              <a:t>Predictive</a:t>
+              <a:rPr lang="en-US" u="sng" dirty="0"/>
+              <a:t>Competitive Intelligence</a:t>
             </a:r>
-            <a:r>
-              <a:rPr lang="en-US" dirty="0" smtClean="0"/>
-              <a:t> Analytics</a:t>
-            </a:r>
-          </a:p>
-          <a:p>
-            <a:endParaRPr lang="en-US" dirty="0" smtClean="0"/>
+          </a:p>
+          <a:p>
+            <a:endParaRPr lang="en-US" dirty="0"/>
           </a:p>
           <a:p>
             <a:pPr marL="285750" indent="-285750">
@@ -12832,24 +12585,11 @@
               <a:buChar char="•"/>
             </a:pPr>
             <a:r>
-              <a:rPr lang="en-US" u="sng" dirty="0" smtClean="0"/>
-              <a:t>Competitive Intelligence</a:t>
-            </a:r>
-          </a:p>
-          <a:p>
-            <a:endParaRPr lang="en-US" dirty="0" smtClean="0"/>
-          </a:p>
-          <a:p>
-            <a:pPr marL="285750" indent="-285750">
-              <a:buFont typeface="Arial" panose="020B0604020202020204" pitchFamily="34" charset="0"/>
-              <a:buChar char="•"/>
-            </a:pPr>
-            <a:r>
-              <a:rPr lang="en-US" dirty="0" smtClean="0"/>
+              <a:rPr lang="en-US" dirty="0"/>
               <a:t>Enhanced datasets for identifying potential </a:t>
             </a:r>
             <a:r>
-              <a:rPr lang="en-US" u="sng" dirty="0" smtClean="0"/>
+              <a:rPr lang="en-US" u="sng" dirty="0"/>
               <a:t>Predatory Lending Practices</a:t>
             </a:r>
           </a:p>
@@ -12863,18 +12603,9 @@
           <a:p>
             <a:pPr algn="ctr"/>
             <a:r>
-              <a:rPr lang="en-US" sz="2400" b="1" dirty="0" smtClean="0"/>
-              <a:t>“Unfiltered Consumer Complaint </a:t>
+              <a:rPr lang="en-US" sz="2400" b="1" dirty="0"/>
+              <a:t>“Unfiltered Consumer Complaint analytics customized for your Company”</a:t>
             </a:r>
-            <a:r>
-              <a:rPr lang="en-US" sz="2400" b="1" dirty="0" smtClean="0"/>
-              <a:t>analytics customized for </a:t>
-            </a:r>
-            <a:r>
-              <a:rPr lang="en-US" sz="2400" b="1" smtClean="0"/>
-              <a:t>your Company”</a:t>
-            </a:r>
-            <a:endParaRPr lang="en-US" sz="2400" b="1" dirty="0"/>
           </a:p>
         </p:txBody>
       </p:sp>
@@ -12888,13 +12619,6 @@
   <p:clrMapOvr>
     <a:masterClrMapping/>
   </p:clrMapOvr>
-  <p:timing>
-    <p:tnLst>
-      <p:par>
-        <p:cTn id="1" dur="indefinite" restart="never" nodeType="tmRoot"/>
-      </p:par>
-    </p:tnLst>
-  </p:timing>
 </p:sld>
 </file>
 

</xml_diff>